<commit_message>
typos and note added to ppt
</commit_message>
<xml_diff>
--- a/Zarovizsga/Anyagok/vedes.pptx
+++ b/Zarovizsga/Anyagok/vedes.pptx
@@ -4,6 +4,9 @@
   <p:sldMasterIdLst>
     <p:sldMasterId id="2147483648" r:id="rId1"/>
   </p:sldMasterIdLst>
+  <p:notesMasterIdLst>
+    <p:notesMasterId r:id="rId11"/>
+  </p:notesMasterIdLst>
   <p:sldIdLst>
     <p:sldId id="256" r:id="rId2"/>
     <p:sldId id="257" r:id="rId3"/>
@@ -120,6 +123,2162 @@
 </p:presentation>
 </file>
 
+<file path=ppt/notesMasters/notesMaster1.xml><?xml version="1.0" encoding="utf-8"?>
+<p:notesMaster xmlns:a="http://schemas.openxmlformats.org/drawingml/2006/main" xmlns:r="http://schemas.openxmlformats.org/officeDocument/2006/relationships" xmlns:p="http://schemas.openxmlformats.org/presentationml/2006/main">
+  <p:cSld>
+    <p:bg>
+      <p:bgRef idx="1001">
+        <a:schemeClr val="bg1"/>
+      </p:bgRef>
+    </p:bg>
+    <p:spTree>
+      <p:nvGrpSpPr>
+        <p:cNvPr id="1" name=""/>
+        <p:cNvGrpSpPr/>
+        <p:nvPr/>
+      </p:nvGrpSpPr>
+      <p:grpSpPr>
+        <a:xfrm>
+          <a:off x="0" y="0"/>
+          <a:ext cx="0" cy="0"/>
+          <a:chOff x="0" y="0"/>
+          <a:chExt cx="0" cy="0"/>
+        </a:xfrm>
+      </p:grpSpPr>
+      <p:sp>
+        <p:nvSpPr>
+          <p:cNvPr id="2" name="Header Placeholder 1"/>
+          <p:cNvSpPr>
+            <a:spLocks noGrp="1"/>
+          </p:cNvSpPr>
+          <p:nvPr>
+            <p:ph type="hdr" sz="quarter"/>
+          </p:nvPr>
+        </p:nvSpPr>
+        <p:spPr>
+          <a:xfrm>
+            <a:off x="0" y="0"/>
+            <a:ext cx="2971800" cy="458788"/>
+          </a:xfrm>
+          <a:prstGeom prst="rect">
+            <a:avLst/>
+          </a:prstGeom>
+        </p:spPr>
+        <p:txBody>
+          <a:bodyPr vert="horz" lIns="91440" tIns="45720" rIns="91440" bIns="45720" rtlCol="0"/>
+          <a:lstStyle>
+            <a:lvl1pPr algn="l">
+              <a:defRPr sz="1200"/>
+            </a:lvl1pPr>
+          </a:lstStyle>
+          <a:p>
+            <a:endParaRPr lang="hu-HU"/>
+          </a:p>
+        </p:txBody>
+      </p:sp>
+      <p:sp>
+        <p:nvSpPr>
+          <p:cNvPr id="3" name="Date Placeholder 2"/>
+          <p:cNvSpPr>
+            <a:spLocks noGrp="1"/>
+          </p:cNvSpPr>
+          <p:nvPr>
+            <p:ph type="dt" idx="1"/>
+          </p:nvPr>
+        </p:nvSpPr>
+        <p:spPr>
+          <a:xfrm>
+            <a:off x="3884613" y="0"/>
+            <a:ext cx="2971800" cy="458788"/>
+          </a:xfrm>
+          <a:prstGeom prst="rect">
+            <a:avLst/>
+          </a:prstGeom>
+        </p:spPr>
+        <p:txBody>
+          <a:bodyPr vert="horz" lIns="91440" tIns="45720" rIns="91440" bIns="45720" rtlCol="0"/>
+          <a:lstStyle>
+            <a:lvl1pPr algn="r">
+              <a:defRPr sz="1200"/>
+            </a:lvl1pPr>
+          </a:lstStyle>
+          <a:p>
+            <a:fld id="{0F109375-9727-41E0-A134-25E7A23D77BA}" type="datetimeFigureOut">
+              <a:rPr lang="hu-HU" smtClean="0"/>
+              <a:t>2022. 06. 12.</a:t>
+            </a:fld>
+            <a:endParaRPr lang="hu-HU"/>
+          </a:p>
+        </p:txBody>
+      </p:sp>
+      <p:sp>
+        <p:nvSpPr>
+          <p:cNvPr id="4" name="Slide Image Placeholder 3"/>
+          <p:cNvSpPr>
+            <a:spLocks noGrp="1" noRot="1" noChangeAspect="1"/>
+          </p:cNvSpPr>
+          <p:nvPr>
+            <p:ph type="sldImg" idx="2"/>
+          </p:nvPr>
+        </p:nvSpPr>
+        <p:spPr>
+          <a:xfrm>
+            <a:off x="685800" y="1143000"/>
+            <a:ext cx="5486400" cy="3086100"/>
+          </a:xfrm>
+          <a:prstGeom prst="rect">
+            <a:avLst/>
+          </a:prstGeom>
+          <a:noFill/>
+          <a:ln w="12700">
+            <a:solidFill>
+              <a:prstClr val="black"/>
+            </a:solidFill>
+          </a:ln>
+        </p:spPr>
+        <p:txBody>
+          <a:bodyPr vert="horz" lIns="91440" tIns="45720" rIns="91440" bIns="45720" rtlCol="0" anchor="ctr"/>
+          <a:lstStyle/>
+          <a:p>
+            <a:endParaRPr lang="hu-HU"/>
+          </a:p>
+        </p:txBody>
+      </p:sp>
+      <p:sp>
+        <p:nvSpPr>
+          <p:cNvPr id="5" name="Notes Placeholder 4"/>
+          <p:cNvSpPr>
+            <a:spLocks noGrp="1"/>
+          </p:cNvSpPr>
+          <p:nvPr>
+            <p:ph type="body" sz="quarter" idx="3"/>
+          </p:nvPr>
+        </p:nvSpPr>
+        <p:spPr>
+          <a:xfrm>
+            <a:off x="685800" y="4400550"/>
+            <a:ext cx="5486400" cy="3600450"/>
+          </a:xfrm>
+          <a:prstGeom prst="rect">
+            <a:avLst/>
+          </a:prstGeom>
+        </p:spPr>
+        <p:txBody>
+          <a:bodyPr vert="horz" lIns="91440" tIns="45720" rIns="91440" bIns="45720" rtlCol="0"/>
+          <a:lstStyle/>
+          <a:p>
+            <a:pPr lvl="0"/>
+            <a:r>
+              <a:rPr lang="en-US"/>
+              <a:t>Click to edit Master text styles</a:t>
+            </a:r>
+          </a:p>
+          <a:p>
+            <a:pPr lvl="1"/>
+            <a:r>
+              <a:rPr lang="en-US"/>
+              <a:t>Second level</a:t>
+            </a:r>
+          </a:p>
+          <a:p>
+            <a:pPr lvl="2"/>
+            <a:r>
+              <a:rPr lang="en-US"/>
+              <a:t>Third level</a:t>
+            </a:r>
+          </a:p>
+          <a:p>
+            <a:pPr lvl="3"/>
+            <a:r>
+              <a:rPr lang="en-US"/>
+              <a:t>Fourth level</a:t>
+            </a:r>
+          </a:p>
+          <a:p>
+            <a:pPr lvl="4"/>
+            <a:r>
+              <a:rPr lang="en-US"/>
+              <a:t>Fifth level</a:t>
+            </a:r>
+            <a:endParaRPr lang="hu-HU"/>
+          </a:p>
+        </p:txBody>
+      </p:sp>
+      <p:sp>
+        <p:nvSpPr>
+          <p:cNvPr id="6" name="Footer Placeholder 5"/>
+          <p:cNvSpPr>
+            <a:spLocks noGrp="1"/>
+          </p:cNvSpPr>
+          <p:nvPr>
+            <p:ph type="ftr" sz="quarter" idx="4"/>
+          </p:nvPr>
+        </p:nvSpPr>
+        <p:spPr>
+          <a:xfrm>
+            <a:off x="0" y="8685213"/>
+            <a:ext cx="2971800" cy="458787"/>
+          </a:xfrm>
+          <a:prstGeom prst="rect">
+            <a:avLst/>
+          </a:prstGeom>
+        </p:spPr>
+        <p:txBody>
+          <a:bodyPr vert="horz" lIns="91440" tIns="45720" rIns="91440" bIns="45720" rtlCol="0" anchor="b"/>
+          <a:lstStyle>
+            <a:lvl1pPr algn="l">
+              <a:defRPr sz="1200"/>
+            </a:lvl1pPr>
+          </a:lstStyle>
+          <a:p>
+            <a:endParaRPr lang="hu-HU"/>
+          </a:p>
+        </p:txBody>
+      </p:sp>
+      <p:sp>
+        <p:nvSpPr>
+          <p:cNvPr id="7" name="Slide Number Placeholder 6"/>
+          <p:cNvSpPr>
+            <a:spLocks noGrp="1"/>
+          </p:cNvSpPr>
+          <p:nvPr>
+            <p:ph type="sldNum" sz="quarter" idx="5"/>
+          </p:nvPr>
+        </p:nvSpPr>
+        <p:spPr>
+          <a:xfrm>
+            <a:off x="3884613" y="8685213"/>
+            <a:ext cx="2971800" cy="458787"/>
+          </a:xfrm>
+          <a:prstGeom prst="rect">
+            <a:avLst/>
+          </a:prstGeom>
+        </p:spPr>
+        <p:txBody>
+          <a:bodyPr vert="horz" lIns="91440" tIns="45720" rIns="91440" bIns="45720" rtlCol="0" anchor="b"/>
+          <a:lstStyle>
+            <a:lvl1pPr algn="r">
+              <a:defRPr sz="1200"/>
+            </a:lvl1pPr>
+          </a:lstStyle>
+          <a:p>
+            <a:fld id="{C6F03F4E-BD47-47CF-B74F-65299C16B74C}" type="slidenum">
+              <a:rPr lang="hu-HU" smtClean="0"/>
+              <a:t>‹#›</a:t>
+            </a:fld>
+            <a:endParaRPr lang="hu-HU"/>
+          </a:p>
+        </p:txBody>
+      </p:sp>
+    </p:spTree>
+    <p:extLst>
+      <p:ext uri="{BB962C8B-B14F-4D97-AF65-F5344CB8AC3E}">
+        <p14:creationId xmlns:p14="http://schemas.microsoft.com/office/powerpoint/2010/main" val="122781335"/>
+      </p:ext>
+    </p:extLst>
+  </p:cSld>
+  <p:clrMap bg1="lt1" tx1="dk1" bg2="lt2" tx2="dk2" accent1="accent1" accent2="accent2" accent3="accent3" accent4="accent4" accent5="accent5" accent6="accent6" hlink="hlink" folHlink="folHlink"/>
+  <p:notesStyle>
+    <a:lvl1pPr marL="0" algn="l" defTabSz="914400" rtl="0" eaLnBrk="1" latinLnBrk="0" hangingPunct="1">
+      <a:defRPr sz="1200" kern="1200">
+        <a:solidFill>
+          <a:schemeClr val="tx1"/>
+        </a:solidFill>
+        <a:latin typeface="+mn-lt"/>
+        <a:ea typeface="+mn-ea"/>
+        <a:cs typeface="+mn-cs"/>
+      </a:defRPr>
+    </a:lvl1pPr>
+    <a:lvl2pPr marL="457200" algn="l" defTabSz="914400" rtl="0" eaLnBrk="1" latinLnBrk="0" hangingPunct="1">
+      <a:defRPr sz="1200" kern="1200">
+        <a:solidFill>
+          <a:schemeClr val="tx1"/>
+        </a:solidFill>
+        <a:latin typeface="+mn-lt"/>
+        <a:ea typeface="+mn-ea"/>
+        <a:cs typeface="+mn-cs"/>
+      </a:defRPr>
+    </a:lvl2pPr>
+    <a:lvl3pPr marL="914400" algn="l" defTabSz="914400" rtl="0" eaLnBrk="1" latinLnBrk="0" hangingPunct="1">
+      <a:defRPr sz="1200" kern="1200">
+        <a:solidFill>
+          <a:schemeClr val="tx1"/>
+        </a:solidFill>
+        <a:latin typeface="+mn-lt"/>
+        <a:ea typeface="+mn-ea"/>
+        <a:cs typeface="+mn-cs"/>
+      </a:defRPr>
+    </a:lvl3pPr>
+    <a:lvl4pPr marL="1371600" algn="l" defTabSz="914400" rtl="0" eaLnBrk="1" latinLnBrk="0" hangingPunct="1">
+      <a:defRPr sz="1200" kern="1200">
+        <a:solidFill>
+          <a:schemeClr val="tx1"/>
+        </a:solidFill>
+        <a:latin typeface="+mn-lt"/>
+        <a:ea typeface="+mn-ea"/>
+        <a:cs typeface="+mn-cs"/>
+      </a:defRPr>
+    </a:lvl4pPr>
+    <a:lvl5pPr marL="1828800" algn="l" defTabSz="914400" rtl="0" eaLnBrk="1" latinLnBrk="0" hangingPunct="1">
+      <a:defRPr sz="1200" kern="1200">
+        <a:solidFill>
+          <a:schemeClr val="tx1"/>
+        </a:solidFill>
+        <a:latin typeface="+mn-lt"/>
+        <a:ea typeface="+mn-ea"/>
+        <a:cs typeface="+mn-cs"/>
+      </a:defRPr>
+    </a:lvl5pPr>
+    <a:lvl6pPr marL="2286000" algn="l" defTabSz="914400" rtl="0" eaLnBrk="1" latinLnBrk="0" hangingPunct="1">
+      <a:defRPr sz="1200" kern="1200">
+        <a:solidFill>
+          <a:schemeClr val="tx1"/>
+        </a:solidFill>
+        <a:latin typeface="+mn-lt"/>
+        <a:ea typeface="+mn-ea"/>
+        <a:cs typeface="+mn-cs"/>
+      </a:defRPr>
+    </a:lvl6pPr>
+    <a:lvl7pPr marL="2743200" algn="l" defTabSz="914400" rtl="0" eaLnBrk="1" latinLnBrk="0" hangingPunct="1">
+      <a:defRPr sz="1200" kern="1200">
+        <a:solidFill>
+          <a:schemeClr val="tx1"/>
+        </a:solidFill>
+        <a:latin typeface="+mn-lt"/>
+        <a:ea typeface="+mn-ea"/>
+        <a:cs typeface="+mn-cs"/>
+      </a:defRPr>
+    </a:lvl7pPr>
+    <a:lvl8pPr marL="3200400" algn="l" defTabSz="914400" rtl="0" eaLnBrk="1" latinLnBrk="0" hangingPunct="1">
+      <a:defRPr sz="1200" kern="1200">
+        <a:solidFill>
+          <a:schemeClr val="tx1"/>
+        </a:solidFill>
+        <a:latin typeface="+mn-lt"/>
+        <a:ea typeface="+mn-ea"/>
+        <a:cs typeface="+mn-cs"/>
+      </a:defRPr>
+    </a:lvl8pPr>
+    <a:lvl9pPr marL="3657600" algn="l" defTabSz="914400" rtl="0" eaLnBrk="1" latinLnBrk="0" hangingPunct="1">
+      <a:defRPr sz="1200" kern="1200">
+        <a:solidFill>
+          <a:schemeClr val="tx1"/>
+        </a:solidFill>
+        <a:latin typeface="+mn-lt"/>
+        <a:ea typeface="+mn-ea"/>
+        <a:cs typeface="+mn-cs"/>
+      </a:defRPr>
+    </a:lvl9pPr>
+  </p:notesStyle>
+</p:notesMaster>
+</file>
+
+<file path=ppt/notesSlides/notesSlide1.xml><?xml version="1.0" encoding="utf-8"?>
+<p:notes xmlns:a="http://schemas.openxmlformats.org/drawingml/2006/main" xmlns:r="http://schemas.openxmlformats.org/officeDocument/2006/relationships" xmlns:p="http://schemas.openxmlformats.org/presentationml/2006/main">
+  <p:cSld>
+    <p:spTree>
+      <p:nvGrpSpPr>
+        <p:cNvPr id="1" name=""/>
+        <p:cNvGrpSpPr/>
+        <p:nvPr/>
+      </p:nvGrpSpPr>
+      <p:grpSpPr>
+        <a:xfrm>
+          <a:off x="0" y="0"/>
+          <a:ext cx="0" cy="0"/>
+          <a:chOff x="0" y="0"/>
+          <a:chExt cx="0" cy="0"/>
+        </a:xfrm>
+      </p:grpSpPr>
+      <p:sp>
+        <p:nvSpPr>
+          <p:cNvPr id="2" name="Slide Image Placeholder 1"/>
+          <p:cNvSpPr>
+            <a:spLocks noGrp="1" noRot="1" noChangeAspect="1"/>
+          </p:cNvSpPr>
+          <p:nvPr>
+            <p:ph type="sldImg"/>
+          </p:nvPr>
+        </p:nvSpPr>
+        <p:spPr/>
+      </p:sp>
+      <p:sp>
+        <p:nvSpPr>
+          <p:cNvPr id="3" name="Notes Placeholder 2"/>
+          <p:cNvSpPr>
+            <a:spLocks noGrp="1"/>
+          </p:cNvSpPr>
+          <p:nvPr>
+            <p:ph type="body" idx="1"/>
+          </p:nvPr>
+        </p:nvSpPr>
+        <p:spPr/>
+        <p:txBody>
+          <a:bodyPr/>
+          <a:lstStyle/>
+          <a:p>
+            <a:r>
+              <a:rPr lang="hu-HU" b="0" i="0" dirty="0">
+                <a:solidFill>
+                  <a:srgbClr val="24292F"/>
+                </a:solidFill>
+                <a:effectLst/>
+                <a:latin typeface="-apple-system"/>
+              </a:rPr>
+              <a:t>Legelső lépésként meg lett határozva egy részletesebb specifikáció és irány a feladathoz. Ez úgy lett kialakítva, hogy elsőként egy </a:t>
+            </a:r>
+            <a:r>
+              <a:rPr lang="hu-HU" b="0" i="0" dirty="0" err="1">
+                <a:solidFill>
+                  <a:srgbClr val="24292F"/>
+                </a:solidFill>
+                <a:effectLst/>
+                <a:latin typeface="-apple-system"/>
+              </a:rPr>
+              <a:t>minimáluis</a:t>
+            </a:r>
+            <a:r>
+              <a:rPr lang="hu-HU" b="0" i="0" dirty="0">
+                <a:solidFill>
+                  <a:srgbClr val="24292F"/>
+                </a:solidFill>
+                <a:effectLst/>
+                <a:latin typeface="-apple-system"/>
+              </a:rPr>
+              <a:t> funkcionalitású, de használható könyvtár legyen létrehozva, úgy, hogy minél könnyebben lehessen továbbfejleszteni vagy módosítani. Cél, hogy a motor és a </a:t>
+            </a:r>
+            <a:r>
+              <a:rPr lang="hu-HU" b="0" i="0" dirty="0" err="1">
+                <a:solidFill>
+                  <a:srgbClr val="24292F"/>
+                </a:solidFill>
+                <a:effectLst/>
+                <a:latin typeface="-apple-system"/>
+              </a:rPr>
+              <a:t>demo</a:t>
+            </a:r>
+            <a:r>
+              <a:rPr lang="hu-HU" b="0" i="0" dirty="0">
+                <a:solidFill>
+                  <a:srgbClr val="24292F"/>
+                </a:solidFill>
+                <a:effectLst/>
+                <a:latin typeface="-apple-system"/>
+              </a:rPr>
+              <a:t> játék minél jobban elkülönüljön egymástól. A labirintust támogató funkciók úgy lettek kialakítva, hogy egy általános, működő megoldást használjunk, de azt lehessen </a:t>
+            </a:r>
+            <a:r>
+              <a:rPr lang="hu-HU" b="0" i="0" dirty="0" err="1">
+                <a:solidFill>
+                  <a:srgbClr val="24292F"/>
+                </a:solidFill>
+                <a:effectLst/>
+                <a:latin typeface="-apple-system"/>
+              </a:rPr>
+              <a:t>testreszabni</a:t>
+            </a:r>
+            <a:r>
+              <a:rPr lang="hu-HU" b="0" i="0" dirty="0">
+                <a:solidFill>
+                  <a:srgbClr val="24292F"/>
+                </a:solidFill>
+                <a:effectLst/>
+                <a:latin typeface="-apple-system"/>
+              </a:rPr>
+              <a:t>.</a:t>
+            </a:r>
+            <a:endParaRPr lang="hu-HU" dirty="0"/>
+          </a:p>
+        </p:txBody>
+      </p:sp>
+      <p:sp>
+        <p:nvSpPr>
+          <p:cNvPr id="4" name="Slide Number Placeholder 3"/>
+          <p:cNvSpPr>
+            <a:spLocks noGrp="1"/>
+          </p:cNvSpPr>
+          <p:nvPr>
+            <p:ph type="sldNum" sz="quarter" idx="5"/>
+          </p:nvPr>
+        </p:nvSpPr>
+        <p:spPr/>
+        <p:txBody>
+          <a:bodyPr/>
+          <a:lstStyle/>
+          <a:p>
+            <a:fld id="{C6F03F4E-BD47-47CF-B74F-65299C16B74C}" type="slidenum">
+              <a:rPr lang="hu-HU" smtClean="0"/>
+              <a:t>2</a:t>
+            </a:fld>
+            <a:endParaRPr lang="hu-HU"/>
+          </a:p>
+        </p:txBody>
+      </p:sp>
+    </p:spTree>
+    <p:extLst>
+      <p:ext uri="{BB962C8B-B14F-4D97-AF65-F5344CB8AC3E}">
+        <p14:creationId xmlns:p14="http://schemas.microsoft.com/office/powerpoint/2010/main" val="389413417"/>
+      </p:ext>
+    </p:extLst>
+  </p:cSld>
+  <p:clrMapOvr>
+    <a:masterClrMapping/>
+  </p:clrMapOvr>
+</p:notes>
+</file>
+
+<file path=ppt/notesSlides/notesSlide2.xml><?xml version="1.0" encoding="utf-8"?>
+<p:notes xmlns:a="http://schemas.openxmlformats.org/drawingml/2006/main" xmlns:r="http://schemas.openxmlformats.org/officeDocument/2006/relationships" xmlns:p="http://schemas.openxmlformats.org/presentationml/2006/main">
+  <p:cSld>
+    <p:spTree>
+      <p:nvGrpSpPr>
+        <p:cNvPr id="1" name=""/>
+        <p:cNvGrpSpPr/>
+        <p:nvPr/>
+      </p:nvGrpSpPr>
+      <p:grpSpPr>
+        <a:xfrm>
+          <a:off x="0" y="0"/>
+          <a:ext cx="0" cy="0"/>
+          <a:chOff x="0" y="0"/>
+          <a:chExt cx="0" cy="0"/>
+        </a:xfrm>
+      </p:grpSpPr>
+      <p:sp>
+        <p:nvSpPr>
+          <p:cNvPr id="2" name="Slide Image Placeholder 1"/>
+          <p:cNvSpPr>
+            <a:spLocks noGrp="1" noRot="1" noChangeAspect="1"/>
+          </p:cNvSpPr>
+          <p:nvPr>
+            <p:ph type="sldImg"/>
+          </p:nvPr>
+        </p:nvSpPr>
+        <p:spPr/>
+      </p:sp>
+      <p:sp>
+        <p:nvSpPr>
+          <p:cNvPr id="3" name="Notes Placeholder 2"/>
+          <p:cNvSpPr>
+            <a:spLocks noGrp="1"/>
+          </p:cNvSpPr>
+          <p:nvPr>
+            <p:ph type="body" idx="1"/>
+          </p:nvPr>
+        </p:nvSpPr>
+        <p:spPr/>
+        <p:txBody>
+          <a:bodyPr/>
+          <a:lstStyle/>
+          <a:p>
+            <a:r>
+              <a:rPr lang="hu-HU" b="0" i="0" dirty="0">
+                <a:solidFill>
+                  <a:srgbClr val="24292F"/>
+                </a:solidFill>
+                <a:effectLst/>
+                <a:latin typeface="-apple-system"/>
+              </a:rPr>
+              <a:t>A tervezés során </a:t>
+            </a:r>
+            <a:r>
+              <a:rPr lang="hu-HU" b="0" i="0" dirty="0" err="1">
+                <a:solidFill>
+                  <a:srgbClr val="24292F"/>
+                </a:solidFill>
+                <a:effectLst/>
+                <a:latin typeface="-apple-system"/>
+              </a:rPr>
+              <a:t>elsosorban</a:t>
+            </a:r>
+            <a:r>
+              <a:rPr lang="hu-HU" b="0" i="0" dirty="0">
+                <a:solidFill>
+                  <a:srgbClr val="24292F"/>
+                </a:solidFill>
+                <a:effectLst/>
+                <a:latin typeface="-apple-system"/>
+              </a:rPr>
+              <a:t> objektum orientált tervezési elvekre és tervezési mintákra </a:t>
+            </a:r>
+            <a:r>
+              <a:rPr lang="hu-HU" b="0" i="0" dirty="0" err="1">
+                <a:solidFill>
+                  <a:srgbClr val="24292F"/>
+                </a:solidFill>
+                <a:effectLst/>
+                <a:latin typeface="-apple-system"/>
+              </a:rPr>
+              <a:t>támaszkodatm</a:t>
+            </a:r>
+            <a:r>
+              <a:rPr lang="hu-HU" b="0" i="0" dirty="0">
+                <a:solidFill>
+                  <a:srgbClr val="24292F"/>
+                </a:solidFill>
+                <a:effectLst/>
+                <a:latin typeface="-apple-system"/>
+              </a:rPr>
+              <a:t>. Ezek garantálták, hogy fenntartható, könnyen módosítható program készüljön el. A projekt generálásának megoldása azért volt fontos, hogy platform és fejlesztőkörnyezet </a:t>
+            </a:r>
+            <a:r>
+              <a:rPr lang="hu-HU" b="0" i="0" dirty="0" err="1">
+                <a:solidFill>
+                  <a:srgbClr val="24292F"/>
+                </a:solidFill>
+                <a:effectLst/>
+                <a:latin typeface="-apple-system"/>
+              </a:rPr>
+              <a:t>függtelen</a:t>
+            </a:r>
+            <a:r>
+              <a:rPr lang="hu-HU" b="0" i="0" dirty="0">
+                <a:solidFill>
+                  <a:srgbClr val="24292F"/>
+                </a:solidFill>
+                <a:effectLst/>
+                <a:latin typeface="-apple-system"/>
+              </a:rPr>
+              <a:t> lehessen a projekt, valamint jól </a:t>
+            </a:r>
+            <a:r>
+              <a:rPr lang="hu-HU" b="0" i="0" dirty="0" err="1">
+                <a:solidFill>
+                  <a:srgbClr val="24292F"/>
+                </a:solidFill>
+                <a:effectLst/>
+                <a:latin typeface="-apple-system"/>
+              </a:rPr>
+              <a:t>működjön</a:t>
+            </a:r>
+            <a:r>
+              <a:rPr lang="hu-HU" b="0" i="0" dirty="0">
+                <a:solidFill>
+                  <a:srgbClr val="24292F"/>
+                </a:solidFill>
+                <a:effectLst/>
+                <a:latin typeface="-apple-system"/>
+              </a:rPr>
+              <a:t> a verziókezelő rendszer. A felhasznált könyvtárak összeillesztéséhez meg kellett tervezni azok </a:t>
+            </a:r>
+            <a:r>
+              <a:rPr lang="hu-HU" b="0" i="0" dirty="0" err="1">
+                <a:solidFill>
+                  <a:srgbClr val="24292F"/>
+                </a:solidFill>
+                <a:effectLst/>
+                <a:latin typeface="-apple-system"/>
+              </a:rPr>
+              <a:t>interface</a:t>
+            </a:r>
+            <a:r>
+              <a:rPr lang="hu-HU" b="0" i="0" dirty="0">
+                <a:solidFill>
+                  <a:srgbClr val="24292F"/>
+                </a:solidFill>
+                <a:effectLst/>
+                <a:latin typeface="-apple-system"/>
+              </a:rPr>
+              <a:t>-t, hogy minél kevesebb probléma merüljön fel. Ez azért is volt fontos, hogy könnyebben ki lehessen cserélni vagy továbbfejleszteni ezeket a könyvtárakat. Meg kellet határozni, hogy miként oszlanak szét a felelősségek, ez a fejlesztés, </a:t>
+            </a:r>
+            <a:r>
+              <a:rPr lang="hu-HU" b="0" i="0" dirty="0" err="1">
+                <a:solidFill>
+                  <a:srgbClr val="24292F"/>
+                </a:solidFill>
+                <a:effectLst/>
+                <a:latin typeface="-apple-system"/>
+              </a:rPr>
+              <a:t>hibajvítás</a:t>
+            </a:r>
+            <a:r>
+              <a:rPr lang="hu-HU" b="0" i="0" dirty="0">
+                <a:solidFill>
+                  <a:srgbClr val="24292F"/>
+                </a:solidFill>
+                <a:effectLst/>
+                <a:latin typeface="-apple-system"/>
+              </a:rPr>
+              <a:t> és módosítások esetén is nagyon fontos. A hibák felderítéséhez </a:t>
+            </a:r>
+            <a:r>
+              <a:rPr lang="hu-HU" b="0" i="0" dirty="0" err="1">
+                <a:solidFill>
+                  <a:srgbClr val="24292F"/>
+                </a:solidFill>
+                <a:effectLst/>
+                <a:latin typeface="-apple-system"/>
+              </a:rPr>
+              <a:t>fontosak</a:t>
+            </a:r>
+            <a:r>
+              <a:rPr lang="hu-HU" b="0" i="0" dirty="0">
+                <a:solidFill>
+                  <a:srgbClr val="24292F"/>
+                </a:solidFill>
+                <a:effectLst/>
+                <a:latin typeface="-apple-system"/>
+              </a:rPr>
+              <a:t> a tesztek és egy jól működő </a:t>
+            </a:r>
+            <a:r>
+              <a:rPr lang="hu-HU" b="0" i="0" dirty="0" err="1">
+                <a:solidFill>
+                  <a:srgbClr val="24292F"/>
+                </a:solidFill>
+                <a:effectLst/>
+                <a:latin typeface="-apple-system"/>
+              </a:rPr>
+              <a:t>logolási</a:t>
+            </a:r>
+            <a:r>
+              <a:rPr lang="hu-HU" b="0" i="0" dirty="0">
+                <a:solidFill>
+                  <a:srgbClr val="24292F"/>
+                </a:solidFill>
+                <a:effectLst/>
+                <a:latin typeface="-apple-system"/>
+              </a:rPr>
+              <a:t> rendszer. Itt készült pár unit teszt a független logikai részekhez, </a:t>
+            </a:r>
+            <a:r>
+              <a:rPr lang="hu-HU" b="0" i="0" dirty="0" err="1">
+                <a:solidFill>
+                  <a:srgbClr val="24292F"/>
+                </a:solidFill>
+                <a:effectLst/>
+                <a:latin typeface="-apple-system"/>
+              </a:rPr>
+              <a:t>valmint</a:t>
+            </a:r>
+            <a:r>
+              <a:rPr lang="hu-HU" b="0" i="0" dirty="0">
+                <a:solidFill>
+                  <a:srgbClr val="24292F"/>
+                </a:solidFill>
+                <a:effectLst/>
+                <a:latin typeface="-apple-system"/>
+              </a:rPr>
+              <a:t> </a:t>
+            </a:r>
+            <a:r>
+              <a:rPr lang="hu-HU" b="0" i="0" dirty="0" err="1">
+                <a:solidFill>
+                  <a:srgbClr val="24292F"/>
+                </a:solidFill>
+                <a:effectLst/>
+                <a:latin typeface="-apple-system"/>
+              </a:rPr>
+              <a:t>demo</a:t>
+            </a:r>
+            <a:r>
+              <a:rPr lang="hu-HU" b="0" i="0" dirty="0">
+                <a:solidFill>
+                  <a:srgbClr val="24292F"/>
+                </a:solidFill>
+                <a:effectLst/>
+                <a:latin typeface="-apple-system"/>
+              </a:rPr>
+              <a:t>-k a használt könyvtárakhoz és magához a motorhoz is.</a:t>
+            </a:r>
+            <a:endParaRPr lang="hu-HU" dirty="0"/>
+          </a:p>
+        </p:txBody>
+      </p:sp>
+      <p:sp>
+        <p:nvSpPr>
+          <p:cNvPr id="4" name="Slide Number Placeholder 3"/>
+          <p:cNvSpPr>
+            <a:spLocks noGrp="1"/>
+          </p:cNvSpPr>
+          <p:nvPr>
+            <p:ph type="sldNum" sz="quarter" idx="5"/>
+          </p:nvPr>
+        </p:nvSpPr>
+        <p:spPr/>
+        <p:txBody>
+          <a:bodyPr/>
+          <a:lstStyle/>
+          <a:p>
+            <a:fld id="{C6F03F4E-BD47-47CF-B74F-65299C16B74C}" type="slidenum">
+              <a:rPr lang="hu-HU" smtClean="0"/>
+              <a:t>3</a:t>
+            </a:fld>
+            <a:endParaRPr lang="hu-HU"/>
+          </a:p>
+        </p:txBody>
+      </p:sp>
+    </p:spTree>
+    <p:extLst>
+      <p:ext uri="{BB962C8B-B14F-4D97-AF65-F5344CB8AC3E}">
+        <p14:creationId xmlns:p14="http://schemas.microsoft.com/office/powerpoint/2010/main" val="2048938220"/>
+      </p:ext>
+    </p:extLst>
+  </p:cSld>
+  <p:clrMapOvr>
+    <a:masterClrMapping/>
+  </p:clrMapOvr>
+</p:notes>
+</file>
+
+<file path=ppt/notesSlides/notesSlide3.xml><?xml version="1.0" encoding="utf-8"?>
+<p:notes xmlns:a="http://schemas.openxmlformats.org/drawingml/2006/main" xmlns:r="http://schemas.openxmlformats.org/officeDocument/2006/relationships" xmlns:p="http://schemas.openxmlformats.org/presentationml/2006/main">
+  <p:cSld>
+    <p:spTree>
+      <p:nvGrpSpPr>
+        <p:cNvPr id="1" name=""/>
+        <p:cNvGrpSpPr/>
+        <p:nvPr/>
+      </p:nvGrpSpPr>
+      <p:grpSpPr>
+        <a:xfrm>
+          <a:off x="0" y="0"/>
+          <a:ext cx="0" cy="0"/>
+          <a:chOff x="0" y="0"/>
+          <a:chExt cx="0" cy="0"/>
+        </a:xfrm>
+      </p:grpSpPr>
+      <p:sp>
+        <p:nvSpPr>
+          <p:cNvPr id="2" name="Slide Image Placeholder 1"/>
+          <p:cNvSpPr>
+            <a:spLocks noGrp="1" noRot="1" noChangeAspect="1"/>
+          </p:cNvSpPr>
+          <p:nvPr>
+            <p:ph type="sldImg"/>
+          </p:nvPr>
+        </p:nvSpPr>
+        <p:spPr/>
+      </p:sp>
+      <p:sp>
+        <p:nvSpPr>
+          <p:cNvPr id="3" name="Notes Placeholder 2"/>
+          <p:cNvSpPr>
+            <a:spLocks noGrp="1"/>
+          </p:cNvSpPr>
+          <p:nvPr>
+            <p:ph type="body" idx="1"/>
+          </p:nvPr>
+        </p:nvSpPr>
+        <p:spPr/>
+        <p:txBody>
+          <a:bodyPr/>
+          <a:lstStyle/>
+          <a:p>
+            <a:r>
+              <a:rPr lang="hu-HU" b="0" i="0" dirty="0">
+                <a:solidFill>
+                  <a:srgbClr val="24292F"/>
+                </a:solidFill>
+                <a:effectLst/>
+                <a:latin typeface="-apple-system"/>
+              </a:rPr>
+              <a:t>Az implementáció, a tervezés alapján történt. Először egy váz készült el, ami játék és motor kapcsolatának logikáját határozta meg. Ezek után el lettek készítve a szükséges </a:t>
+            </a:r>
+            <a:r>
+              <a:rPr lang="hu-HU" b="0" i="0" dirty="0" err="1">
+                <a:solidFill>
+                  <a:srgbClr val="24292F"/>
+                </a:solidFill>
+                <a:effectLst/>
+                <a:latin typeface="-apple-system"/>
+              </a:rPr>
+              <a:t>interface</a:t>
+            </a:r>
+            <a:r>
+              <a:rPr lang="hu-HU" b="0" i="0" dirty="0">
+                <a:solidFill>
+                  <a:srgbClr val="24292F"/>
+                </a:solidFill>
+                <a:effectLst/>
+                <a:latin typeface="-apple-system"/>
+              </a:rPr>
+              <a:t>-ek. Az </a:t>
+            </a:r>
+            <a:r>
+              <a:rPr lang="hu-HU" b="0" i="0" dirty="0" err="1">
+                <a:solidFill>
+                  <a:srgbClr val="24292F"/>
+                </a:solidFill>
+                <a:effectLst/>
+                <a:latin typeface="-apple-system"/>
+              </a:rPr>
+              <a:t>interface</a:t>
+            </a:r>
+            <a:r>
+              <a:rPr lang="hu-HU" b="0" i="0" dirty="0">
+                <a:solidFill>
+                  <a:srgbClr val="24292F"/>
+                </a:solidFill>
+                <a:effectLst/>
+                <a:latin typeface="-apple-system"/>
+              </a:rPr>
+              <a:t>-ek azért </a:t>
+            </a:r>
+            <a:r>
+              <a:rPr lang="hu-HU" b="0" i="0" dirty="0" err="1">
+                <a:solidFill>
+                  <a:srgbClr val="24292F"/>
+                </a:solidFill>
+                <a:effectLst/>
+                <a:latin typeface="-apple-system"/>
+              </a:rPr>
+              <a:t>fontosak</a:t>
+            </a:r>
+            <a:r>
+              <a:rPr lang="hu-HU" b="0" i="0" dirty="0">
+                <a:solidFill>
+                  <a:srgbClr val="24292F"/>
+                </a:solidFill>
+                <a:effectLst/>
+                <a:latin typeface="-apple-system"/>
+              </a:rPr>
+              <a:t>, hogy a mögöttük levő logika változása, minél függetlenebb legyen a többi kódrésztől. Implementálásra kerültek a központi logikai elemek, például a játék fő ciklusa. Ekkor lettek integrálva a külső könyvtárak is, amik el lettek rejtve </a:t>
+            </a:r>
+            <a:r>
+              <a:rPr lang="hu-HU" b="0" i="0" dirty="0" err="1">
+                <a:solidFill>
+                  <a:srgbClr val="24292F"/>
+                </a:solidFill>
+                <a:effectLst/>
+                <a:latin typeface="-apple-system"/>
+              </a:rPr>
+              <a:t>interface</a:t>
+            </a:r>
+            <a:r>
+              <a:rPr lang="hu-HU" b="0" i="0" dirty="0">
+                <a:solidFill>
+                  <a:srgbClr val="24292F"/>
+                </a:solidFill>
+                <a:effectLst/>
+                <a:latin typeface="-apple-system"/>
+              </a:rPr>
+              <a:t>-ek mögé, hogy cseréjük minél egyszerűbb legyen. A funkciók ezután lettek lefejlesztve, mindegyik a </a:t>
+            </a:r>
+            <a:r>
+              <a:rPr lang="hu-HU" b="0" i="0" dirty="0" err="1">
+                <a:solidFill>
+                  <a:srgbClr val="24292F"/>
+                </a:solidFill>
+                <a:effectLst/>
+                <a:latin typeface="-apple-system"/>
+              </a:rPr>
+              <a:t>sceletonban</a:t>
+            </a:r>
+            <a:r>
+              <a:rPr lang="hu-HU" b="0" i="0" dirty="0">
+                <a:solidFill>
+                  <a:srgbClr val="24292F"/>
+                </a:solidFill>
+                <a:effectLst/>
+                <a:latin typeface="-apple-system"/>
+              </a:rPr>
+              <a:t> meghatározott helyén. A funkciók fejlesztésével párhuzamosan volt fejlesztve a játék is. Ez egy tesztként funkcionált, ami mindig nyomon követte a motor fejlődését. A könnyebb használatért több </a:t>
+            </a:r>
+            <a:r>
+              <a:rPr lang="hu-HU" b="0" i="0" dirty="0" err="1">
+                <a:solidFill>
+                  <a:srgbClr val="24292F"/>
+                </a:solidFill>
+                <a:effectLst/>
+                <a:latin typeface="-apple-system"/>
+              </a:rPr>
+              <a:t>default</a:t>
+            </a:r>
+            <a:r>
+              <a:rPr lang="hu-HU" b="0" i="0" dirty="0">
+                <a:solidFill>
+                  <a:srgbClr val="24292F"/>
+                </a:solidFill>
+                <a:effectLst/>
+                <a:latin typeface="-apple-system"/>
+              </a:rPr>
+              <a:t> beállítás, algoritmus és érték is meg lett határozva. Ilyen például egy labirintus </a:t>
+            </a:r>
+            <a:r>
+              <a:rPr lang="hu-HU" b="0" i="0" dirty="0" err="1">
+                <a:solidFill>
+                  <a:srgbClr val="24292F"/>
+                </a:solidFill>
+                <a:effectLst/>
+                <a:latin typeface="-apple-system"/>
+              </a:rPr>
+              <a:t>generló</a:t>
+            </a:r>
+            <a:r>
+              <a:rPr lang="hu-HU" b="0" i="0" dirty="0">
+                <a:solidFill>
+                  <a:srgbClr val="24292F"/>
+                </a:solidFill>
+                <a:effectLst/>
+                <a:latin typeface="-apple-system"/>
+              </a:rPr>
+              <a:t> </a:t>
+            </a:r>
+            <a:r>
+              <a:rPr lang="hu-HU" b="0" i="0" dirty="0" err="1">
+                <a:solidFill>
+                  <a:srgbClr val="24292F"/>
+                </a:solidFill>
+                <a:effectLst/>
+                <a:latin typeface="-apple-system"/>
+              </a:rPr>
+              <a:t>algorimtus</a:t>
+            </a:r>
+            <a:r>
+              <a:rPr lang="hu-HU" b="0" i="0" dirty="0">
+                <a:solidFill>
+                  <a:srgbClr val="24292F"/>
+                </a:solidFill>
+                <a:effectLst/>
+                <a:latin typeface="-apple-system"/>
+              </a:rPr>
+              <a:t>, a alapértelmezett inputok vagy a textúrázott téglalap.</a:t>
+            </a:r>
+            <a:endParaRPr lang="hu-HU" dirty="0"/>
+          </a:p>
+        </p:txBody>
+      </p:sp>
+      <p:sp>
+        <p:nvSpPr>
+          <p:cNvPr id="4" name="Slide Number Placeholder 3"/>
+          <p:cNvSpPr>
+            <a:spLocks noGrp="1"/>
+          </p:cNvSpPr>
+          <p:nvPr>
+            <p:ph type="sldNum" sz="quarter" idx="5"/>
+          </p:nvPr>
+        </p:nvSpPr>
+        <p:spPr/>
+        <p:txBody>
+          <a:bodyPr/>
+          <a:lstStyle/>
+          <a:p>
+            <a:fld id="{C6F03F4E-BD47-47CF-B74F-65299C16B74C}" type="slidenum">
+              <a:rPr lang="hu-HU" smtClean="0"/>
+              <a:t>4</a:t>
+            </a:fld>
+            <a:endParaRPr lang="hu-HU"/>
+          </a:p>
+        </p:txBody>
+      </p:sp>
+    </p:spTree>
+    <p:extLst>
+      <p:ext uri="{BB962C8B-B14F-4D97-AF65-F5344CB8AC3E}">
+        <p14:creationId xmlns:p14="http://schemas.microsoft.com/office/powerpoint/2010/main" val="1980997285"/>
+      </p:ext>
+    </p:extLst>
+  </p:cSld>
+  <p:clrMapOvr>
+    <a:masterClrMapping/>
+  </p:clrMapOvr>
+</p:notes>
+</file>
+
+<file path=ppt/notesSlides/notesSlide4.xml><?xml version="1.0" encoding="utf-8"?>
+<p:notes xmlns:a="http://schemas.openxmlformats.org/drawingml/2006/main" xmlns:r="http://schemas.openxmlformats.org/officeDocument/2006/relationships" xmlns:p="http://schemas.openxmlformats.org/presentationml/2006/main">
+  <p:cSld>
+    <p:spTree>
+      <p:nvGrpSpPr>
+        <p:cNvPr id="1" name=""/>
+        <p:cNvGrpSpPr/>
+        <p:nvPr/>
+      </p:nvGrpSpPr>
+      <p:grpSpPr>
+        <a:xfrm>
+          <a:off x="0" y="0"/>
+          <a:ext cx="0" cy="0"/>
+          <a:chOff x="0" y="0"/>
+          <a:chExt cx="0" cy="0"/>
+        </a:xfrm>
+      </p:grpSpPr>
+      <p:sp>
+        <p:nvSpPr>
+          <p:cNvPr id="2" name="Slide Image Placeholder 1"/>
+          <p:cNvSpPr>
+            <a:spLocks noGrp="1" noRot="1" noChangeAspect="1"/>
+          </p:cNvSpPr>
+          <p:nvPr>
+            <p:ph type="sldImg"/>
+          </p:nvPr>
+        </p:nvSpPr>
+        <p:spPr/>
+      </p:sp>
+      <p:sp>
+        <p:nvSpPr>
+          <p:cNvPr id="3" name="Notes Placeholder 2"/>
+          <p:cNvSpPr>
+            <a:spLocks noGrp="1"/>
+          </p:cNvSpPr>
+          <p:nvPr>
+            <p:ph type="body" idx="1"/>
+          </p:nvPr>
+        </p:nvSpPr>
+        <p:spPr/>
+        <p:txBody>
+          <a:bodyPr/>
+          <a:lstStyle/>
+          <a:p>
+            <a:r>
+              <a:rPr lang="hu-HU" b="0" i="0" dirty="0">
+                <a:solidFill>
+                  <a:srgbClr val="24292F"/>
+                </a:solidFill>
+                <a:effectLst/>
+                <a:latin typeface="-apple-system"/>
+              </a:rPr>
+              <a:t>A végeredmény magában foglalja az elkészült motor könyvtárat és egy </a:t>
+            </a:r>
+            <a:r>
+              <a:rPr lang="hu-HU" b="0" i="0" dirty="0" err="1">
+                <a:solidFill>
+                  <a:srgbClr val="24292F"/>
+                </a:solidFill>
+                <a:effectLst/>
+                <a:latin typeface="-apple-system"/>
+              </a:rPr>
+              <a:t>demo</a:t>
+            </a:r>
+            <a:r>
+              <a:rPr lang="hu-HU" b="0" i="0" dirty="0">
+                <a:solidFill>
+                  <a:srgbClr val="24292F"/>
+                </a:solidFill>
+                <a:effectLst/>
+                <a:latin typeface="-apple-system"/>
+              </a:rPr>
+              <a:t> alkalmazást ami </a:t>
+            </a:r>
+            <a:r>
+              <a:rPr lang="hu-HU" b="0" i="0" dirty="0" err="1">
+                <a:solidFill>
+                  <a:srgbClr val="24292F"/>
+                </a:solidFill>
+                <a:effectLst/>
+                <a:latin typeface="-apple-system"/>
+              </a:rPr>
+              <a:t>megmutattja</a:t>
+            </a:r>
+            <a:r>
+              <a:rPr lang="hu-HU" b="0" i="0" dirty="0">
+                <a:solidFill>
+                  <a:srgbClr val="24292F"/>
+                </a:solidFill>
+                <a:effectLst/>
+                <a:latin typeface="-apple-system"/>
+              </a:rPr>
+              <a:t> a használatát. A motor képes egy beépített algoritmussal legenerálni egy útvesztőt, de van lehetőség saját algoritmus implementálására is. Ezen kívül vannak beépített grafikus objektumok, amiket létre lehet hozni, de újak létrehozásához is biztosít eszközöket a motor. A </a:t>
+            </a:r>
+            <a:r>
+              <a:rPr lang="hu-HU" b="0" i="0" dirty="0" err="1">
+                <a:solidFill>
+                  <a:srgbClr val="24292F"/>
+                </a:solidFill>
+                <a:effectLst/>
+                <a:latin typeface="-apple-system"/>
+              </a:rPr>
+              <a:t>motornban</a:t>
+            </a:r>
+            <a:r>
+              <a:rPr lang="hu-HU" b="0" i="0" dirty="0">
+                <a:solidFill>
+                  <a:srgbClr val="24292F"/>
+                </a:solidFill>
+                <a:effectLst/>
+                <a:latin typeface="-apple-system"/>
+              </a:rPr>
+              <a:t> van egy beépített input értelmező rendszer, amit azonban tetszőleges lehet módosítani. Motor szinten lehet objektumok közötti ütközést detektálni és annak hatását szimulálni. Természetesen rengeteg módon lehet továbbfejleszteni a motort, mind funkciók mind kényelmi eszközök terén.</a:t>
+            </a:r>
+            <a:endParaRPr lang="hu-HU" dirty="0"/>
+          </a:p>
+        </p:txBody>
+      </p:sp>
+      <p:sp>
+        <p:nvSpPr>
+          <p:cNvPr id="4" name="Slide Number Placeholder 3"/>
+          <p:cNvSpPr>
+            <a:spLocks noGrp="1"/>
+          </p:cNvSpPr>
+          <p:nvPr>
+            <p:ph type="sldNum" sz="quarter" idx="5"/>
+          </p:nvPr>
+        </p:nvSpPr>
+        <p:spPr/>
+        <p:txBody>
+          <a:bodyPr/>
+          <a:lstStyle/>
+          <a:p>
+            <a:fld id="{C6F03F4E-BD47-47CF-B74F-65299C16B74C}" type="slidenum">
+              <a:rPr lang="hu-HU" smtClean="0"/>
+              <a:t>5</a:t>
+            </a:fld>
+            <a:endParaRPr lang="hu-HU"/>
+          </a:p>
+        </p:txBody>
+      </p:sp>
+    </p:spTree>
+    <p:extLst>
+      <p:ext uri="{BB962C8B-B14F-4D97-AF65-F5344CB8AC3E}">
+        <p14:creationId xmlns:p14="http://schemas.microsoft.com/office/powerpoint/2010/main" val="2069446421"/>
+      </p:ext>
+    </p:extLst>
+  </p:cSld>
+  <p:clrMapOvr>
+    <a:masterClrMapping/>
+  </p:clrMapOvr>
+</p:notes>
+</file>
+
+<file path=ppt/notesSlides/notesSlide5.xml><?xml version="1.0" encoding="utf-8"?>
+<p:notes xmlns:a="http://schemas.openxmlformats.org/drawingml/2006/main" xmlns:r="http://schemas.openxmlformats.org/officeDocument/2006/relationships" xmlns:p="http://schemas.openxmlformats.org/presentationml/2006/main">
+  <p:cSld>
+    <p:spTree>
+      <p:nvGrpSpPr>
+        <p:cNvPr id="1" name=""/>
+        <p:cNvGrpSpPr/>
+        <p:nvPr/>
+      </p:nvGrpSpPr>
+      <p:grpSpPr>
+        <a:xfrm>
+          <a:off x="0" y="0"/>
+          <a:ext cx="0" cy="0"/>
+          <a:chOff x="0" y="0"/>
+          <a:chExt cx="0" cy="0"/>
+        </a:xfrm>
+      </p:grpSpPr>
+      <p:sp>
+        <p:nvSpPr>
+          <p:cNvPr id="2" name="Slide Image Placeholder 1"/>
+          <p:cNvSpPr>
+            <a:spLocks noGrp="1" noRot="1" noChangeAspect="1"/>
+          </p:cNvSpPr>
+          <p:nvPr>
+            <p:ph type="sldImg"/>
+          </p:nvPr>
+        </p:nvSpPr>
+        <p:spPr/>
+      </p:sp>
+      <p:sp>
+        <p:nvSpPr>
+          <p:cNvPr id="3" name="Notes Placeholder 2"/>
+          <p:cNvSpPr>
+            <a:spLocks noGrp="1"/>
+          </p:cNvSpPr>
+          <p:nvPr>
+            <p:ph type="body" idx="1"/>
+          </p:nvPr>
+        </p:nvSpPr>
+        <p:spPr/>
+        <p:txBody>
+          <a:bodyPr/>
+          <a:lstStyle/>
+          <a:p>
+            <a:r>
+              <a:rPr lang="hu-HU" b="0" i="0" dirty="0">
+                <a:solidFill>
+                  <a:srgbClr val="24292F"/>
+                </a:solidFill>
+                <a:effectLst/>
+                <a:latin typeface="-apple-system"/>
+              </a:rPr>
+              <a:t>Két megválaszolandó kérdés merült fel a bírálat során. Az egyik az osztályok részletesebb bemutatását kérte, kitérve arra, hogy hogyan lehet új </a:t>
+            </a:r>
+            <a:r>
+              <a:rPr lang="hu-HU" b="0" i="0" dirty="0" err="1">
+                <a:solidFill>
+                  <a:srgbClr val="24292F"/>
+                </a:solidFill>
+                <a:effectLst/>
+                <a:latin typeface="-apple-system"/>
+              </a:rPr>
+              <a:t>shadert</a:t>
+            </a:r>
+            <a:r>
+              <a:rPr lang="hu-HU" b="0" i="0" dirty="0">
+                <a:solidFill>
+                  <a:srgbClr val="24292F"/>
+                </a:solidFill>
+                <a:effectLst/>
+                <a:latin typeface="-apple-system"/>
+              </a:rPr>
+              <a:t>, textúrát és geometriát készíteni. A másik kérdés a labirintus generáló algoritmusra irányult.</a:t>
+            </a:r>
+            <a:endParaRPr lang="hu-HU" dirty="0"/>
+          </a:p>
+        </p:txBody>
+      </p:sp>
+      <p:sp>
+        <p:nvSpPr>
+          <p:cNvPr id="4" name="Slide Number Placeholder 3"/>
+          <p:cNvSpPr>
+            <a:spLocks noGrp="1"/>
+          </p:cNvSpPr>
+          <p:nvPr>
+            <p:ph type="sldNum" sz="quarter" idx="5"/>
+          </p:nvPr>
+        </p:nvSpPr>
+        <p:spPr/>
+        <p:txBody>
+          <a:bodyPr/>
+          <a:lstStyle/>
+          <a:p>
+            <a:fld id="{C6F03F4E-BD47-47CF-B74F-65299C16B74C}" type="slidenum">
+              <a:rPr lang="hu-HU" smtClean="0"/>
+              <a:t>6</a:t>
+            </a:fld>
+            <a:endParaRPr lang="hu-HU"/>
+          </a:p>
+        </p:txBody>
+      </p:sp>
+    </p:spTree>
+    <p:extLst>
+      <p:ext uri="{BB962C8B-B14F-4D97-AF65-F5344CB8AC3E}">
+        <p14:creationId xmlns:p14="http://schemas.microsoft.com/office/powerpoint/2010/main" val="3816879777"/>
+      </p:ext>
+    </p:extLst>
+  </p:cSld>
+  <p:clrMapOvr>
+    <a:masterClrMapping/>
+  </p:clrMapOvr>
+</p:notes>
+</file>
+
+<file path=ppt/notesSlides/notesSlide6.xml><?xml version="1.0" encoding="utf-8"?>
+<p:notes xmlns:a="http://schemas.openxmlformats.org/drawingml/2006/main" xmlns:r="http://schemas.openxmlformats.org/officeDocument/2006/relationships" xmlns:p="http://schemas.openxmlformats.org/presentationml/2006/main">
+  <p:cSld>
+    <p:spTree>
+      <p:nvGrpSpPr>
+        <p:cNvPr id="1" name=""/>
+        <p:cNvGrpSpPr/>
+        <p:nvPr/>
+      </p:nvGrpSpPr>
+      <p:grpSpPr>
+        <a:xfrm>
+          <a:off x="0" y="0"/>
+          <a:ext cx="0" cy="0"/>
+          <a:chOff x="0" y="0"/>
+          <a:chExt cx="0" cy="0"/>
+        </a:xfrm>
+      </p:grpSpPr>
+      <p:sp>
+        <p:nvSpPr>
+          <p:cNvPr id="2" name="Slide Image Placeholder 1"/>
+          <p:cNvSpPr>
+            <a:spLocks noGrp="1" noRot="1" noChangeAspect="1"/>
+          </p:cNvSpPr>
+          <p:nvPr>
+            <p:ph type="sldImg"/>
+          </p:nvPr>
+        </p:nvSpPr>
+        <p:spPr/>
+      </p:sp>
+      <p:sp>
+        <p:nvSpPr>
+          <p:cNvPr id="3" name="Notes Placeholder 2"/>
+          <p:cNvSpPr>
+            <a:spLocks noGrp="1"/>
+          </p:cNvSpPr>
+          <p:nvPr>
+            <p:ph type="body" idx="1"/>
+          </p:nvPr>
+        </p:nvSpPr>
+        <p:spPr/>
+        <p:txBody>
+          <a:bodyPr/>
+          <a:lstStyle/>
+          <a:p>
+            <a:pPr algn="l"/>
+            <a:r>
+              <a:rPr lang="hu-HU" b="0" i="0" dirty="0">
+                <a:solidFill>
+                  <a:srgbClr val="24292F"/>
+                </a:solidFill>
+                <a:effectLst/>
+                <a:latin typeface="-apple-system"/>
+              </a:rPr>
+              <a:t>Az algoritmus a </a:t>
+            </a:r>
+            <a:r>
+              <a:rPr lang="hu-HU" b="0" i="0" dirty="0" err="1">
+                <a:solidFill>
+                  <a:srgbClr val="24292F"/>
+                </a:solidFill>
+                <a:effectLst/>
+                <a:latin typeface="-apple-system"/>
+              </a:rPr>
+              <a:t>Kruskal</a:t>
+            </a:r>
+            <a:r>
+              <a:rPr lang="hu-HU" b="0" i="0" dirty="0">
+                <a:solidFill>
+                  <a:srgbClr val="24292F"/>
+                </a:solidFill>
+                <a:effectLst/>
+                <a:latin typeface="-apple-system"/>
+              </a:rPr>
+              <a:t> algoritmus módosított változata. Ennek lényege, hogy egy súlyozott gráfban keresi a legkisebb súlyú feszítőfát. Ez </a:t>
+            </a:r>
+            <a:r>
+              <a:rPr lang="hu-HU" b="0" i="0" dirty="0" err="1">
+                <a:solidFill>
+                  <a:srgbClr val="24292F"/>
+                </a:solidFill>
+                <a:effectLst/>
+                <a:latin typeface="-apple-system"/>
+              </a:rPr>
+              <a:t>annyban</a:t>
+            </a:r>
+            <a:r>
+              <a:rPr lang="hu-HU" b="0" i="0" dirty="0">
+                <a:solidFill>
+                  <a:srgbClr val="24292F"/>
+                </a:solidFill>
+                <a:effectLst/>
+                <a:latin typeface="-apple-system"/>
+              </a:rPr>
+              <a:t> módosul, hogy a gráf nem </a:t>
+            </a:r>
+            <a:r>
+              <a:rPr lang="hu-HU" b="0" i="0" dirty="0" err="1">
+                <a:solidFill>
+                  <a:srgbClr val="24292F"/>
+                </a:solidFill>
+                <a:effectLst/>
+                <a:latin typeface="-apple-system"/>
+              </a:rPr>
+              <a:t>súlyoztt</a:t>
+            </a:r>
+            <a:r>
+              <a:rPr lang="hu-HU" b="0" i="0" dirty="0">
+                <a:solidFill>
+                  <a:srgbClr val="24292F"/>
+                </a:solidFill>
+                <a:effectLst/>
+                <a:latin typeface="-apple-system"/>
+              </a:rPr>
+              <a:t>, hanem véletlenszerűen választjuk ki az éleket. A megoldás menete, hogy választunk egy élet, amiről megnézzük, hogy a két vége között van-e már </a:t>
+            </a:r>
+            <a:r>
+              <a:rPr lang="hu-HU" b="0" i="0" dirty="0" err="1">
+                <a:solidFill>
+                  <a:srgbClr val="24292F"/>
+                </a:solidFill>
+                <a:effectLst/>
+                <a:latin typeface="-apple-system"/>
+              </a:rPr>
+              <a:t>ut</a:t>
+            </a:r>
+            <a:r>
+              <a:rPr lang="hu-HU" b="0" i="0" dirty="0">
+                <a:solidFill>
+                  <a:srgbClr val="24292F"/>
+                </a:solidFill>
+                <a:effectLst/>
+                <a:latin typeface="-apple-system"/>
+              </a:rPr>
+              <a:t>, ha nincs bevesszük az élet a megoldásba, ha van eldobjuk. A labirintus úgy van megfeleltetve egy gráfnak, hogy a mezők élek az utak pedig a csúcsok. Kezdetben a szomszédos csúcsok között van él. A végeredményben szereplő élek helyén lesznek utak, ahonnan pedig elvettük az éleket ott falak lesznek.</a:t>
+            </a:r>
+          </a:p>
+          <a:p>
+            <a:pPr algn="l"/>
+            <a:r>
+              <a:rPr lang="hu-HU" b="0" i="0" dirty="0">
+                <a:solidFill>
+                  <a:srgbClr val="24292F"/>
+                </a:solidFill>
+                <a:effectLst/>
+                <a:latin typeface="-apple-system"/>
+              </a:rPr>
+              <a:t>A megoldás a start mezőből indított mélységi </a:t>
+            </a:r>
+            <a:r>
+              <a:rPr lang="hu-HU" b="0" i="0" dirty="0" err="1">
+                <a:solidFill>
+                  <a:srgbClr val="24292F"/>
+                </a:solidFill>
+                <a:effectLst/>
+                <a:latin typeface="-apple-system"/>
+              </a:rPr>
+              <a:t>kereséssek</a:t>
+            </a:r>
+            <a:r>
+              <a:rPr lang="hu-HU" b="0" i="0" dirty="0">
+                <a:solidFill>
+                  <a:srgbClr val="24292F"/>
+                </a:solidFill>
+                <a:effectLst/>
+                <a:latin typeface="-apple-system"/>
+              </a:rPr>
+              <a:t> adható meg.</a:t>
+            </a:r>
+          </a:p>
+          <a:p>
+            <a:endParaRPr lang="hu-HU" dirty="0"/>
+          </a:p>
+        </p:txBody>
+      </p:sp>
+      <p:sp>
+        <p:nvSpPr>
+          <p:cNvPr id="4" name="Slide Number Placeholder 3"/>
+          <p:cNvSpPr>
+            <a:spLocks noGrp="1"/>
+          </p:cNvSpPr>
+          <p:nvPr>
+            <p:ph type="sldNum" sz="quarter" idx="5"/>
+          </p:nvPr>
+        </p:nvSpPr>
+        <p:spPr/>
+        <p:txBody>
+          <a:bodyPr/>
+          <a:lstStyle/>
+          <a:p>
+            <a:fld id="{C6F03F4E-BD47-47CF-B74F-65299C16B74C}" type="slidenum">
+              <a:rPr lang="hu-HU" smtClean="0"/>
+              <a:t>7</a:t>
+            </a:fld>
+            <a:endParaRPr lang="hu-HU"/>
+          </a:p>
+        </p:txBody>
+      </p:sp>
+    </p:spTree>
+    <p:extLst>
+      <p:ext uri="{BB962C8B-B14F-4D97-AF65-F5344CB8AC3E}">
+        <p14:creationId xmlns:p14="http://schemas.microsoft.com/office/powerpoint/2010/main" val="1273193608"/>
+      </p:ext>
+    </p:extLst>
+  </p:cSld>
+  <p:clrMapOvr>
+    <a:masterClrMapping/>
+  </p:clrMapOvr>
+</p:notes>
+</file>
+
+<file path=ppt/notesSlides/notesSlide7.xml><?xml version="1.0" encoding="utf-8"?>
+<p:notes xmlns:a="http://schemas.openxmlformats.org/drawingml/2006/main" xmlns:r="http://schemas.openxmlformats.org/officeDocument/2006/relationships" xmlns:p="http://schemas.openxmlformats.org/presentationml/2006/main">
+  <p:cSld>
+    <p:spTree>
+      <p:nvGrpSpPr>
+        <p:cNvPr id="1" name=""/>
+        <p:cNvGrpSpPr/>
+        <p:nvPr/>
+      </p:nvGrpSpPr>
+      <p:grpSpPr>
+        <a:xfrm>
+          <a:off x="0" y="0"/>
+          <a:ext cx="0" cy="0"/>
+          <a:chOff x="0" y="0"/>
+          <a:chExt cx="0" cy="0"/>
+        </a:xfrm>
+      </p:grpSpPr>
+      <p:sp>
+        <p:nvSpPr>
+          <p:cNvPr id="2" name="Slide Image Placeholder 1"/>
+          <p:cNvSpPr>
+            <a:spLocks noGrp="1" noRot="1" noChangeAspect="1"/>
+          </p:cNvSpPr>
+          <p:nvPr>
+            <p:ph type="sldImg"/>
+          </p:nvPr>
+        </p:nvSpPr>
+        <p:spPr/>
+      </p:sp>
+      <p:sp>
+        <p:nvSpPr>
+          <p:cNvPr id="3" name="Notes Placeholder 2"/>
+          <p:cNvSpPr>
+            <a:spLocks noGrp="1"/>
+          </p:cNvSpPr>
+          <p:nvPr>
+            <p:ph type="body" idx="1"/>
+          </p:nvPr>
+        </p:nvSpPr>
+        <p:spPr/>
+        <p:txBody>
+          <a:bodyPr/>
+          <a:lstStyle/>
+          <a:p>
+            <a:pPr algn="l"/>
+            <a:r>
+              <a:rPr lang="hu-HU" b="0" i="0" dirty="0">
+                <a:solidFill>
+                  <a:srgbClr val="24292F"/>
+                </a:solidFill>
+                <a:effectLst/>
+                <a:latin typeface="-apple-system"/>
+              </a:rPr>
+              <a:t>Új grafikus objektum létrehozásához használható, a Renderer </a:t>
+            </a:r>
+            <a:r>
+              <a:rPr lang="hu-HU" b="0" i="0" dirty="0" err="1">
+                <a:solidFill>
+                  <a:srgbClr val="24292F"/>
+                </a:solidFill>
+                <a:effectLst/>
+                <a:latin typeface="-apple-system"/>
+              </a:rPr>
+              <a:t>APIban</a:t>
+            </a:r>
+            <a:r>
+              <a:rPr lang="hu-HU" b="0" i="0" dirty="0">
+                <a:solidFill>
+                  <a:srgbClr val="24292F"/>
+                </a:solidFill>
+                <a:effectLst/>
+                <a:latin typeface="-apple-system"/>
+              </a:rPr>
+              <a:t> létrehozott shader és textura osztály. Ezek meghívják a megfelelő platform megfelelő függvényeit. Ezen kívül az új objektumért felelős osztálynak a </a:t>
+            </a:r>
+            <a:r>
+              <a:rPr lang="hu-HU" b="0" i="0" dirty="0" err="1">
+                <a:solidFill>
+                  <a:srgbClr val="24292F"/>
+                </a:solidFill>
+                <a:effectLst/>
+                <a:latin typeface="-apple-system"/>
+              </a:rPr>
+              <a:t>GameObject-ből</a:t>
+            </a:r>
+            <a:r>
+              <a:rPr lang="hu-HU" b="0" i="0" dirty="0">
+                <a:solidFill>
+                  <a:srgbClr val="24292F"/>
+                </a:solidFill>
+                <a:effectLst/>
+                <a:latin typeface="-apple-system"/>
+              </a:rPr>
+              <a:t> kell leszármaznia. Az más geometria leírásához nem készültek el a </a:t>
+            </a:r>
+            <a:r>
+              <a:rPr lang="hu-HU" b="0" i="0" dirty="0" err="1">
+                <a:solidFill>
+                  <a:srgbClr val="24292F"/>
+                </a:solidFill>
+                <a:effectLst/>
+                <a:latin typeface="-apple-system"/>
+              </a:rPr>
+              <a:t>wrapper</a:t>
+            </a:r>
+            <a:r>
+              <a:rPr lang="hu-HU" b="0" i="0" dirty="0">
+                <a:solidFill>
+                  <a:srgbClr val="24292F"/>
+                </a:solidFill>
+                <a:effectLst/>
+                <a:latin typeface="-apple-system"/>
+              </a:rPr>
+              <a:t> osztályok, ezeket OpenGL parancsokkal lehet megoldani.</a:t>
+            </a:r>
+          </a:p>
+          <a:p>
+            <a:pPr algn="l"/>
+            <a:r>
+              <a:rPr lang="hu-HU" b="0" i="0" dirty="0">
+                <a:solidFill>
+                  <a:srgbClr val="24292F"/>
+                </a:solidFill>
+                <a:effectLst/>
+                <a:latin typeface="-apple-system"/>
+              </a:rPr>
+              <a:t>Az osztályok négy nagyobb egységbe sorolhatóak be. Ezek a Motor, a játék, a labirintus és a platform függő kódok.</a:t>
+            </a:r>
+          </a:p>
+          <a:p>
+            <a:endParaRPr lang="hu-HU" dirty="0"/>
+          </a:p>
+        </p:txBody>
+      </p:sp>
+      <p:sp>
+        <p:nvSpPr>
+          <p:cNvPr id="4" name="Slide Number Placeholder 3"/>
+          <p:cNvSpPr>
+            <a:spLocks noGrp="1"/>
+          </p:cNvSpPr>
+          <p:nvPr>
+            <p:ph type="sldNum" sz="quarter" idx="5"/>
+          </p:nvPr>
+        </p:nvSpPr>
+        <p:spPr/>
+        <p:txBody>
+          <a:bodyPr/>
+          <a:lstStyle/>
+          <a:p>
+            <a:fld id="{C6F03F4E-BD47-47CF-B74F-65299C16B74C}" type="slidenum">
+              <a:rPr lang="hu-HU" smtClean="0"/>
+              <a:t>8</a:t>
+            </a:fld>
+            <a:endParaRPr lang="hu-HU"/>
+          </a:p>
+        </p:txBody>
+      </p:sp>
+    </p:spTree>
+    <p:extLst>
+      <p:ext uri="{BB962C8B-B14F-4D97-AF65-F5344CB8AC3E}">
+        <p14:creationId xmlns:p14="http://schemas.microsoft.com/office/powerpoint/2010/main" val="668536088"/>
+      </p:ext>
+    </p:extLst>
+  </p:cSld>
+  <p:clrMapOvr>
+    <a:masterClrMapping/>
+  </p:clrMapOvr>
+</p:notes>
+</file>
+
+<file path=ppt/notesSlides/notesSlide8.xml><?xml version="1.0" encoding="utf-8"?>
+<p:notes xmlns:a="http://schemas.openxmlformats.org/drawingml/2006/main" xmlns:r="http://schemas.openxmlformats.org/officeDocument/2006/relationships" xmlns:p="http://schemas.openxmlformats.org/presentationml/2006/main">
+  <p:cSld>
+    <p:spTree>
+      <p:nvGrpSpPr>
+        <p:cNvPr id="1" name=""/>
+        <p:cNvGrpSpPr/>
+        <p:nvPr/>
+      </p:nvGrpSpPr>
+      <p:grpSpPr>
+        <a:xfrm>
+          <a:off x="0" y="0"/>
+          <a:ext cx="0" cy="0"/>
+          <a:chOff x="0" y="0"/>
+          <a:chExt cx="0" cy="0"/>
+        </a:xfrm>
+      </p:grpSpPr>
+      <p:sp>
+        <p:nvSpPr>
+          <p:cNvPr id="2" name="Slide Image Placeholder 1"/>
+          <p:cNvSpPr>
+            <a:spLocks noGrp="1" noRot="1" noChangeAspect="1"/>
+          </p:cNvSpPr>
+          <p:nvPr>
+            <p:ph type="sldImg"/>
+          </p:nvPr>
+        </p:nvSpPr>
+        <p:spPr/>
+      </p:sp>
+      <p:sp>
+        <p:nvSpPr>
+          <p:cNvPr id="3" name="Notes Placeholder 2"/>
+          <p:cNvSpPr>
+            <a:spLocks noGrp="1"/>
+          </p:cNvSpPr>
+          <p:nvPr>
+            <p:ph type="body" idx="1"/>
+          </p:nvPr>
+        </p:nvSpPr>
+        <p:spPr/>
+        <p:txBody>
+          <a:bodyPr/>
+          <a:lstStyle/>
+          <a:p>
+            <a:pPr algn="l"/>
+            <a:r>
+              <a:rPr lang="hu-HU" b="0" i="0" dirty="0">
+                <a:solidFill>
+                  <a:srgbClr val="24292F"/>
+                </a:solidFill>
+                <a:effectLst/>
+                <a:latin typeface="-apple-system"/>
+              </a:rPr>
+              <a:t>A játék logikájáért és megjelenéséért felelős osztályok a motor </a:t>
+            </a:r>
+            <a:r>
+              <a:rPr lang="hu-HU" b="0" i="0" dirty="0" err="1">
+                <a:solidFill>
+                  <a:srgbClr val="24292F"/>
+                </a:solidFill>
+                <a:effectLst/>
+                <a:latin typeface="-apple-system"/>
+              </a:rPr>
+              <a:t>beli</a:t>
+            </a:r>
+            <a:r>
+              <a:rPr lang="hu-HU" b="0" i="0" dirty="0">
+                <a:solidFill>
+                  <a:srgbClr val="24292F"/>
+                </a:solidFill>
+                <a:effectLst/>
+                <a:latin typeface="-apple-system"/>
+              </a:rPr>
+              <a:t> osztályok leszármazottjai. Ezeken kívül a játék még használhatja </a:t>
+            </a:r>
+            <a:r>
+              <a:rPr lang="hu-HU" b="0" i="0" dirty="0" err="1">
+                <a:solidFill>
+                  <a:srgbClr val="24292F"/>
+                </a:solidFill>
+                <a:effectLst/>
+                <a:latin typeface="-apple-system"/>
+              </a:rPr>
+              <a:t>RendererAPI</a:t>
+            </a:r>
+            <a:r>
+              <a:rPr lang="hu-HU" b="0" i="0" dirty="0">
+                <a:solidFill>
+                  <a:srgbClr val="24292F"/>
+                </a:solidFill>
+                <a:effectLst/>
+                <a:latin typeface="-apple-system"/>
+              </a:rPr>
+              <a:t>-t, a labirintust és új parancsot rendelhet bemenetkehez. A </a:t>
+            </a:r>
+            <a:r>
+              <a:rPr lang="hu-HU" b="0" i="0" dirty="0" err="1">
+                <a:solidFill>
+                  <a:srgbClr val="24292F"/>
+                </a:solidFill>
+                <a:effectLst/>
+                <a:latin typeface="-apple-system"/>
+              </a:rPr>
+              <a:t>GraphicsProfram</a:t>
+            </a:r>
+            <a:r>
+              <a:rPr lang="hu-HU" b="0" i="0" dirty="0">
+                <a:solidFill>
+                  <a:srgbClr val="24292F"/>
+                </a:solidFill>
+                <a:effectLst/>
+                <a:latin typeface="-apple-system"/>
+              </a:rPr>
+              <a:t> leszármazott </a:t>
+            </a:r>
+            <a:r>
+              <a:rPr lang="hu-HU" b="0" i="0" dirty="0" err="1">
+                <a:solidFill>
+                  <a:srgbClr val="24292F"/>
+                </a:solidFill>
+                <a:effectLst/>
+                <a:latin typeface="-apple-system"/>
+              </a:rPr>
+              <a:t>LabyrinthGame</a:t>
+            </a:r>
+            <a:r>
+              <a:rPr lang="hu-HU" b="0" i="0" dirty="0">
+                <a:solidFill>
+                  <a:srgbClr val="24292F"/>
+                </a:solidFill>
+                <a:effectLst/>
+                <a:latin typeface="-apple-system"/>
+              </a:rPr>
+              <a:t> </a:t>
+            </a:r>
+            <a:r>
+              <a:rPr lang="hu-HU" b="0" i="0" dirty="0" err="1">
+                <a:solidFill>
+                  <a:srgbClr val="24292F"/>
+                </a:solidFill>
+                <a:effectLst/>
+                <a:latin typeface="-apple-system"/>
+              </a:rPr>
+              <a:t>példányosításával</a:t>
+            </a:r>
+            <a:r>
+              <a:rPr lang="hu-HU" b="0" i="0" dirty="0">
+                <a:solidFill>
+                  <a:srgbClr val="24292F"/>
+                </a:solidFill>
+                <a:effectLst/>
+                <a:latin typeface="-apple-system"/>
+              </a:rPr>
+              <a:t> jön létre a játék.</a:t>
+            </a:r>
+          </a:p>
+          <a:p>
+            <a:pPr algn="l"/>
+            <a:r>
+              <a:rPr lang="hu-HU" b="0" i="0" dirty="0">
+                <a:solidFill>
+                  <a:srgbClr val="24292F"/>
+                </a:solidFill>
+                <a:effectLst/>
+                <a:latin typeface="-apple-system"/>
+              </a:rPr>
+              <a:t>A labirintusért felelős rész áll egy osztályból aminek </a:t>
+            </a:r>
+            <a:r>
+              <a:rPr lang="hu-HU" b="0" i="0" dirty="0" err="1">
+                <a:solidFill>
+                  <a:srgbClr val="24292F"/>
+                </a:solidFill>
+                <a:effectLst/>
+                <a:latin typeface="-apple-system"/>
+              </a:rPr>
+              <a:t>példányosításával</a:t>
+            </a:r>
+            <a:r>
+              <a:rPr lang="hu-HU" b="0" i="0" dirty="0">
+                <a:solidFill>
+                  <a:srgbClr val="24292F"/>
+                </a:solidFill>
+                <a:effectLst/>
+                <a:latin typeface="-apple-system"/>
+              </a:rPr>
+              <a:t> létrehozható egy labirintus. Ez használ egy </a:t>
+            </a:r>
+            <a:r>
+              <a:rPr lang="hu-HU" b="0" i="0" dirty="0" err="1">
+                <a:solidFill>
+                  <a:srgbClr val="24292F"/>
+                </a:solidFill>
+                <a:effectLst/>
+                <a:latin typeface="-apple-system"/>
+              </a:rPr>
+              <a:t>data</a:t>
+            </a:r>
+            <a:r>
+              <a:rPr lang="hu-HU" b="0" i="0" dirty="0">
+                <a:solidFill>
+                  <a:srgbClr val="24292F"/>
+                </a:solidFill>
+                <a:effectLst/>
+                <a:latin typeface="-apple-system"/>
+              </a:rPr>
+              <a:t>, egy generáló és egy megjelenítő osztályt. A megjelenítő osztály platform függő és ő hozza létre az ütköző objektumokat is.</a:t>
+            </a:r>
+          </a:p>
+          <a:p>
+            <a:pPr algn="l"/>
+            <a:r>
+              <a:rPr lang="hu-HU" b="0" i="0" dirty="0">
+                <a:solidFill>
+                  <a:srgbClr val="24292F"/>
+                </a:solidFill>
+                <a:effectLst/>
+                <a:latin typeface="-apple-system"/>
+              </a:rPr>
+              <a:t>A platform függő rész a </a:t>
+            </a:r>
+            <a:r>
+              <a:rPr lang="hu-HU" b="0" i="0" dirty="0" err="1">
+                <a:solidFill>
+                  <a:srgbClr val="24292F"/>
+                </a:solidFill>
+                <a:effectLst/>
+                <a:latin typeface="-apple-system"/>
+              </a:rPr>
+              <a:t>motorbeli</a:t>
+            </a:r>
+            <a:r>
+              <a:rPr lang="hu-HU" b="0" i="0" dirty="0">
+                <a:solidFill>
+                  <a:srgbClr val="24292F"/>
+                </a:solidFill>
+                <a:effectLst/>
+                <a:latin typeface="-apple-system"/>
+              </a:rPr>
+              <a:t> </a:t>
+            </a:r>
+            <a:r>
+              <a:rPr lang="hu-HU" b="0" i="0" dirty="0" err="1">
+                <a:solidFill>
+                  <a:srgbClr val="24292F"/>
+                </a:solidFill>
+                <a:effectLst/>
+                <a:latin typeface="-apple-system"/>
+              </a:rPr>
+              <a:t>interface</a:t>
+            </a:r>
+            <a:r>
+              <a:rPr lang="hu-HU" b="0" i="0" dirty="0">
+                <a:solidFill>
+                  <a:srgbClr val="24292F"/>
+                </a:solidFill>
+                <a:effectLst/>
+                <a:latin typeface="-apple-system"/>
+              </a:rPr>
+              <a:t>-ek konkrét megvalósításait tartalmazza. Ilyen a </a:t>
+            </a:r>
+            <a:r>
+              <a:rPr lang="hu-HU" b="0" i="0" dirty="0" err="1">
+                <a:solidFill>
+                  <a:srgbClr val="24292F"/>
+                </a:solidFill>
+                <a:effectLst/>
+                <a:latin typeface="-apple-system"/>
+              </a:rPr>
+              <a:t>rendererAPI</a:t>
+            </a:r>
+            <a:r>
+              <a:rPr lang="hu-HU" b="0" i="0" dirty="0">
+                <a:solidFill>
+                  <a:srgbClr val="24292F"/>
+                </a:solidFill>
+                <a:effectLst/>
+                <a:latin typeface="-apple-system"/>
+              </a:rPr>
+              <a:t>-t megvalósító OpenGL Renderer API, a </a:t>
+            </a:r>
+            <a:r>
+              <a:rPr lang="hu-HU" b="0" i="0" dirty="0" err="1">
+                <a:solidFill>
+                  <a:srgbClr val="24292F"/>
+                </a:solidFill>
+                <a:effectLst/>
+                <a:latin typeface="-apple-system"/>
+              </a:rPr>
+              <a:t>Window</a:t>
+            </a:r>
+            <a:r>
+              <a:rPr lang="hu-HU" b="0" i="0" dirty="0">
+                <a:solidFill>
+                  <a:srgbClr val="24292F"/>
+                </a:solidFill>
+                <a:effectLst/>
+                <a:latin typeface="-apple-system"/>
+              </a:rPr>
+              <a:t> osztály és részben a </a:t>
+            </a:r>
+            <a:r>
+              <a:rPr lang="hu-HU" b="0" i="0" dirty="0" err="1">
+                <a:solidFill>
+                  <a:srgbClr val="24292F"/>
+                </a:solidFill>
+                <a:effectLst/>
+                <a:latin typeface="-apple-system"/>
+              </a:rPr>
+              <a:t>TexturedRectangle</a:t>
+            </a:r>
+            <a:r>
+              <a:rPr lang="hu-HU" b="0" i="0" dirty="0">
+                <a:solidFill>
+                  <a:srgbClr val="24292F"/>
+                </a:solidFill>
+                <a:effectLst/>
+                <a:latin typeface="-apple-system"/>
+              </a:rPr>
+              <a:t> osztály, ami tartalmaz olyan OpenGL hívásokat, amikhez még nem készült </a:t>
+            </a:r>
+            <a:r>
+              <a:rPr lang="hu-HU" b="0" i="0" dirty="0" err="1">
+                <a:solidFill>
+                  <a:srgbClr val="24292F"/>
+                </a:solidFill>
+                <a:effectLst/>
+                <a:latin typeface="-apple-system"/>
+              </a:rPr>
+              <a:t>wrapper</a:t>
+            </a:r>
+            <a:r>
+              <a:rPr lang="hu-HU" b="0" i="0" dirty="0">
+                <a:solidFill>
+                  <a:srgbClr val="24292F"/>
+                </a:solidFill>
+                <a:effectLst/>
+                <a:latin typeface="-apple-system"/>
+              </a:rPr>
+              <a:t>. Az inputok </a:t>
+            </a:r>
+            <a:r>
+              <a:rPr lang="hu-HU" b="0" i="0" dirty="0" err="1">
+                <a:solidFill>
+                  <a:srgbClr val="24292F"/>
+                </a:solidFill>
+                <a:effectLst/>
+                <a:latin typeface="-apple-system"/>
+              </a:rPr>
+              <a:t>windows</a:t>
+            </a:r>
+            <a:r>
+              <a:rPr lang="hu-HU" b="0" i="0" dirty="0">
+                <a:solidFill>
+                  <a:srgbClr val="24292F"/>
+                </a:solidFill>
+                <a:effectLst/>
+                <a:latin typeface="-apple-system"/>
+              </a:rPr>
+              <a:t>-os kezelése is itt valósul meg.</a:t>
+            </a:r>
+          </a:p>
+          <a:p>
+            <a:pPr algn="l"/>
+            <a:r>
+              <a:rPr lang="hu-HU" b="0" i="0" dirty="0">
+                <a:solidFill>
+                  <a:srgbClr val="24292F"/>
+                </a:solidFill>
+                <a:effectLst/>
+                <a:latin typeface="-apple-system"/>
+              </a:rPr>
+              <a:t>A motor leginkább alaplogikákat és </a:t>
+            </a:r>
+            <a:r>
+              <a:rPr lang="hu-HU" b="0" i="0" dirty="0" err="1">
+                <a:solidFill>
+                  <a:srgbClr val="24292F"/>
+                </a:solidFill>
+                <a:effectLst/>
+                <a:latin typeface="-apple-system"/>
+              </a:rPr>
+              <a:t>interface-eket</a:t>
+            </a:r>
+            <a:r>
+              <a:rPr lang="hu-HU" b="0" i="0" dirty="0">
+                <a:solidFill>
+                  <a:srgbClr val="24292F"/>
+                </a:solidFill>
+                <a:effectLst/>
+                <a:latin typeface="-apple-system"/>
+              </a:rPr>
+              <a:t> tartalmaz. Ilyen a fő ciklus, ami frissíti az adatszerkezeteket és kirajzolja amit kell. A inputok általános kezelése is itt történik. A </a:t>
+            </a:r>
+            <a:r>
+              <a:rPr lang="hu-HU" b="0" i="0" dirty="0" err="1">
+                <a:solidFill>
+                  <a:srgbClr val="24292F"/>
+                </a:solidFill>
+                <a:effectLst/>
+                <a:latin typeface="-apple-system"/>
+              </a:rPr>
+              <a:t>GameObject</a:t>
+            </a:r>
+            <a:r>
+              <a:rPr lang="hu-HU" b="0" i="0" dirty="0">
+                <a:solidFill>
+                  <a:srgbClr val="24292F"/>
+                </a:solidFill>
+                <a:effectLst/>
+                <a:latin typeface="-apple-system"/>
+              </a:rPr>
+              <a:t> minden olyan objektum őse, amit szeretnénk használni a játékhoz.</a:t>
+            </a:r>
+          </a:p>
+          <a:p>
+            <a:endParaRPr lang="hu-HU" dirty="0"/>
+          </a:p>
+        </p:txBody>
+      </p:sp>
+      <p:sp>
+        <p:nvSpPr>
+          <p:cNvPr id="4" name="Slide Number Placeholder 3"/>
+          <p:cNvSpPr>
+            <a:spLocks noGrp="1"/>
+          </p:cNvSpPr>
+          <p:nvPr>
+            <p:ph type="sldNum" sz="quarter" idx="5"/>
+          </p:nvPr>
+        </p:nvSpPr>
+        <p:spPr/>
+        <p:txBody>
+          <a:bodyPr/>
+          <a:lstStyle/>
+          <a:p>
+            <a:fld id="{C6F03F4E-BD47-47CF-B74F-65299C16B74C}" type="slidenum">
+              <a:rPr lang="hu-HU" smtClean="0"/>
+              <a:t>9</a:t>
+            </a:fld>
+            <a:endParaRPr lang="hu-HU"/>
+          </a:p>
+        </p:txBody>
+      </p:sp>
+    </p:spTree>
+    <p:extLst>
+      <p:ext uri="{BB962C8B-B14F-4D97-AF65-F5344CB8AC3E}">
+        <p14:creationId xmlns:p14="http://schemas.microsoft.com/office/powerpoint/2010/main" val="2273797397"/>
+      </p:ext>
+    </p:extLst>
+  </p:cSld>
+  <p:clrMapOvr>
+    <a:masterClrMapping/>
+  </p:clrMapOvr>
+</p:notes>
+</file>
+
 <file path=ppt/slideLayouts/slideLayout1.xml><?xml version="1.0" encoding="utf-8"?>
 <p:sldLayout xmlns:a="http://schemas.openxmlformats.org/drawingml/2006/main" xmlns:r="http://schemas.openxmlformats.org/officeDocument/2006/relationships" xmlns:p="http://schemas.openxmlformats.org/presentationml/2006/main" type="title" preserve="1">
   <p:cSld name="Title Slide">
@@ -269,7 +2428,7 @@
           <a:p>
             <a:fld id="{0777088F-1BD3-4E41-9B72-2163E949E1D7}" type="datetimeFigureOut">
               <a:rPr lang="hu-HU" smtClean="0"/>
-              <a:t>2022. 06. 06.</a:t>
+              <a:t>2022. 06. 12.</a:t>
             </a:fld>
             <a:endParaRPr lang="hu-HU"/>
           </a:p>
@@ -469,7 +2628,7 @@
           <a:p>
             <a:fld id="{0777088F-1BD3-4E41-9B72-2163E949E1D7}" type="datetimeFigureOut">
               <a:rPr lang="hu-HU" smtClean="0"/>
-              <a:t>2022. 06. 06.</a:t>
+              <a:t>2022. 06. 12.</a:t>
             </a:fld>
             <a:endParaRPr lang="hu-HU"/>
           </a:p>
@@ -679,7 +2838,7 @@
           <a:p>
             <a:fld id="{0777088F-1BD3-4E41-9B72-2163E949E1D7}" type="datetimeFigureOut">
               <a:rPr lang="hu-HU" smtClean="0"/>
-              <a:t>2022. 06. 06.</a:t>
+              <a:t>2022. 06. 12.</a:t>
             </a:fld>
             <a:endParaRPr lang="hu-HU"/>
           </a:p>
@@ -879,7 +3038,7 @@
           <a:p>
             <a:fld id="{0777088F-1BD3-4E41-9B72-2163E949E1D7}" type="datetimeFigureOut">
               <a:rPr lang="hu-HU" smtClean="0"/>
-              <a:t>2022. 06. 06.</a:t>
+              <a:t>2022. 06. 12.</a:t>
             </a:fld>
             <a:endParaRPr lang="hu-HU"/>
           </a:p>
@@ -1155,7 +3314,7 @@
           <a:p>
             <a:fld id="{0777088F-1BD3-4E41-9B72-2163E949E1D7}" type="datetimeFigureOut">
               <a:rPr lang="hu-HU" smtClean="0"/>
-              <a:t>2022. 06. 06.</a:t>
+              <a:t>2022. 06. 12.</a:t>
             </a:fld>
             <a:endParaRPr lang="hu-HU"/>
           </a:p>
@@ -1423,7 +3582,7 @@
           <a:p>
             <a:fld id="{0777088F-1BD3-4E41-9B72-2163E949E1D7}" type="datetimeFigureOut">
               <a:rPr lang="hu-HU" smtClean="0"/>
-              <a:t>2022. 06. 06.</a:t>
+              <a:t>2022. 06. 12.</a:t>
             </a:fld>
             <a:endParaRPr lang="hu-HU"/>
           </a:p>
@@ -1838,7 +3997,7 @@
           <a:p>
             <a:fld id="{0777088F-1BD3-4E41-9B72-2163E949E1D7}" type="datetimeFigureOut">
               <a:rPr lang="hu-HU" smtClean="0"/>
-              <a:t>2022. 06. 06.</a:t>
+              <a:t>2022. 06. 12.</a:t>
             </a:fld>
             <a:endParaRPr lang="hu-HU"/>
           </a:p>
@@ -1980,7 +4139,7 @@
           <a:p>
             <a:fld id="{0777088F-1BD3-4E41-9B72-2163E949E1D7}" type="datetimeFigureOut">
               <a:rPr lang="hu-HU" smtClean="0"/>
-              <a:t>2022. 06. 06.</a:t>
+              <a:t>2022. 06. 12.</a:t>
             </a:fld>
             <a:endParaRPr lang="hu-HU"/>
           </a:p>
@@ -2093,7 +4252,7 @@
           <a:p>
             <a:fld id="{0777088F-1BD3-4E41-9B72-2163E949E1D7}" type="datetimeFigureOut">
               <a:rPr lang="hu-HU" smtClean="0"/>
-              <a:t>2022. 06. 06.</a:t>
+              <a:t>2022. 06. 12.</a:t>
             </a:fld>
             <a:endParaRPr lang="hu-HU"/>
           </a:p>
@@ -2406,7 +4565,7 @@
           <a:p>
             <a:fld id="{0777088F-1BD3-4E41-9B72-2163E949E1D7}" type="datetimeFigureOut">
               <a:rPr lang="hu-HU" smtClean="0"/>
-              <a:t>2022. 06. 06.</a:t>
+              <a:t>2022. 06. 12.</a:t>
             </a:fld>
             <a:endParaRPr lang="hu-HU"/>
           </a:p>
@@ -2695,7 +4854,7 @@
           <a:p>
             <a:fld id="{0777088F-1BD3-4E41-9B72-2163E949E1D7}" type="datetimeFigureOut">
               <a:rPr lang="hu-HU" smtClean="0"/>
-              <a:t>2022. 06. 06.</a:t>
+              <a:t>2022. 06. 12.</a:t>
             </a:fld>
             <a:endParaRPr lang="hu-HU"/>
           </a:p>
@@ -2938,7 +5097,7 @@
           <a:p>
             <a:fld id="{0777088F-1BD3-4E41-9B72-2163E949E1D7}" type="datetimeFigureOut">
               <a:rPr lang="hu-HU" smtClean="0"/>
-              <a:t>2022. 06. 06.</a:t>
+              <a:t>2022. 06. 12.</a:t>
             </a:fld>
             <a:endParaRPr lang="hu-HU"/>
           </a:p>
@@ -3711,7 +5870,7 @@
           <p:nvPr/>
         </p:nvPicPr>
         <p:blipFill>
-          <a:blip r:embed="rId2"/>
+          <a:blip r:embed="rId3"/>
           <a:stretch>
             <a:fillRect/>
           </a:stretch>
@@ -4049,7 +6208,7 @@
           <p:nvPr/>
         </p:nvPicPr>
         <p:blipFill>
-          <a:blip r:embed="rId2"/>
+          <a:blip r:embed="rId3"/>
           <a:stretch>
             <a:fillRect/>
           </a:stretch>
@@ -4629,7 +6788,7 @@
           </p:nvPr>
         </p:nvPicPr>
         <p:blipFill>
-          <a:blip r:embed="rId2">
+          <a:blip r:embed="rId3">
             <a:extLst>
               <a:ext uri="{28A0092B-C50C-407E-A947-70E740481C1C}">
                 <a14:useLocalDpi xmlns:a14="http://schemas.microsoft.com/office/drawing/2010/main" val="0"/>
@@ -4956,4 +7115,299 @@
     </a:ext>
   </a:extLst>
 </a:theme>
+</file>
+
+<file path=ppt/theme/theme2.xml><?xml version="1.0" encoding="utf-8"?>
+<a:theme xmlns:a="http://schemas.openxmlformats.org/drawingml/2006/main" name="Office Theme">
+  <a:themeElements>
+    <a:clrScheme name="Office">
+      <a:dk1>
+        <a:sysClr val="windowText" lastClr="000000"/>
+      </a:dk1>
+      <a:lt1>
+        <a:sysClr val="window" lastClr="FFFFFF"/>
+      </a:lt1>
+      <a:dk2>
+        <a:srgbClr val="44546A"/>
+      </a:dk2>
+      <a:lt2>
+        <a:srgbClr val="E7E6E6"/>
+      </a:lt2>
+      <a:accent1>
+        <a:srgbClr val="4472C4"/>
+      </a:accent1>
+      <a:accent2>
+        <a:srgbClr val="ED7D31"/>
+      </a:accent2>
+      <a:accent3>
+        <a:srgbClr val="A5A5A5"/>
+      </a:accent3>
+      <a:accent4>
+        <a:srgbClr val="FFC000"/>
+      </a:accent4>
+      <a:accent5>
+        <a:srgbClr val="5B9BD5"/>
+      </a:accent5>
+      <a:accent6>
+        <a:srgbClr val="70AD47"/>
+      </a:accent6>
+      <a:hlink>
+        <a:srgbClr val="0563C1"/>
+      </a:hlink>
+      <a:folHlink>
+        <a:srgbClr val="954F72"/>
+      </a:folHlink>
+    </a:clrScheme>
+    <a:fontScheme name="Office">
+      <a:majorFont>
+        <a:latin typeface="Calibri Light" panose="020F0302020204030204"/>
+        <a:ea typeface=""/>
+        <a:cs typeface=""/>
+        <a:font script="Jpan" typeface="游ゴシック Light"/>
+        <a:font script="Hang" typeface="맑은 고딕"/>
+        <a:font script="Hans" typeface="等线 Light"/>
+        <a:font script="Hant" typeface="新細明體"/>
+        <a:font script="Arab" typeface="Times New Roman"/>
+        <a:font script="Hebr" typeface="Times New Roman"/>
+        <a:font script="Thai" typeface="Angsana New"/>
+        <a:font script="Ethi" typeface="Nyala"/>
+        <a:font script="Beng" typeface="Vrinda"/>
+        <a:font script="Gujr" typeface="Shruti"/>
+        <a:font script="Khmr" typeface="MoolBoran"/>
+        <a:font script="Knda" typeface="Tunga"/>
+        <a:font script="Guru" typeface="Raavi"/>
+        <a:font script="Cans" typeface="Euphemia"/>
+        <a:font script="Cher" typeface="Plantagenet Cherokee"/>
+        <a:font script="Yiii" typeface="Microsoft Yi Baiti"/>
+        <a:font script="Tibt" typeface="Microsoft Himalaya"/>
+        <a:font script="Thaa" typeface="MV Boli"/>
+        <a:font script="Deva" typeface="Mangal"/>
+        <a:font script="Telu" typeface="Gautami"/>
+        <a:font script="Taml" typeface="Latha"/>
+        <a:font script="Syrc" typeface="Estrangelo Edessa"/>
+        <a:font script="Orya" typeface="Kalinga"/>
+        <a:font script="Mlym" typeface="Kartika"/>
+        <a:font script="Laoo" typeface="DokChampa"/>
+        <a:font script="Sinh" typeface="Iskoola Pota"/>
+        <a:font script="Mong" typeface="Mongolian Baiti"/>
+        <a:font script="Viet" typeface="Times New Roman"/>
+        <a:font script="Uigh" typeface="Microsoft Uighur"/>
+        <a:font script="Geor" typeface="Sylfaen"/>
+        <a:font script="Armn" typeface="Arial"/>
+        <a:font script="Bugi" typeface="Leelawadee UI"/>
+        <a:font script="Bopo" typeface="Microsoft JhengHei"/>
+        <a:font script="Java" typeface="Javanese Text"/>
+        <a:font script="Lisu" typeface="Segoe UI"/>
+        <a:font script="Mymr" typeface="Myanmar Text"/>
+        <a:font script="Nkoo" typeface="Ebrima"/>
+        <a:font script="Olck" typeface="Nirmala UI"/>
+        <a:font script="Osma" typeface="Ebrima"/>
+        <a:font script="Phag" typeface="Phagspa"/>
+        <a:font script="Syrn" typeface="Estrangelo Edessa"/>
+        <a:font script="Syrj" typeface="Estrangelo Edessa"/>
+        <a:font script="Syre" typeface="Estrangelo Edessa"/>
+        <a:font script="Sora" typeface="Nirmala UI"/>
+        <a:font script="Tale" typeface="Microsoft Tai Le"/>
+        <a:font script="Talu" typeface="Microsoft New Tai Lue"/>
+        <a:font script="Tfng" typeface="Ebrima"/>
+      </a:majorFont>
+      <a:minorFont>
+        <a:latin typeface="Calibri" panose="020F0502020204030204"/>
+        <a:ea typeface=""/>
+        <a:cs typeface=""/>
+        <a:font script="Jpan" typeface="游ゴシック"/>
+        <a:font script="Hang" typeface="맑은 고딕"/>
+        <a:font script="Hans" typeface="等线"/>
+        <a:font script="Hant" typeface="新細明體"/>
+        <a:font script="Arab" typeface="Arial"/>
+        <a:font script="Hebr" typeface="Arial"/>
+        <a:font script="Thai" typeface="Cordia New"/>
+        <a:font script="Ethi" typeface="Nyala"/>
+        <a:font script="Beng" typeface="Vrinda"/>
+        <a:font script="Gujr" typeface="Shruti"/>
+        <a:font script="Khmr" typeface="DaunPenh"/>
+        <a:font script="Knda" typeface="Tunga"/>
+        <a:font script="Guru" typeface="Raavi"/>
+        <a:font script="Cans" typeface="Euphemia"/>
+        <a:font script="Cher" typeface="Plantagenet Cherokee"/>
+        <a:font script="Yiii" typeface="Microsoft Yi Baiti"/>
+        <a:font script="Tibt" typeface="Microsoft Himalaya"/>
+        <a:font script="Thaa" typeface="MV Boli"/>
+        <a:font script="Deva" typeface="Mangal"/>
+        <a:font script="Telu" typeface="Gautami"/>
+        <a:font script="Taml" typeface="Latha"/>
+        <a:font script="Syrc" typeface="Estrangelo Edessa"/>
+        <a:font script="Orya" typeface="Kalinga"/>
+        <a:font script="Mlym" typeface="Kartika"/>
+        <a:font script="Laoo" typeface="DokChampa"/>
+        <a:font script="Sinh" typeface="Iskoola Pota"/>
+        <a:font script="Mong" typeface="Mongolian Baiti"/>
+        <a:font script="Viet" typeface="Arial"/>
+        <a:font script="Uigh" typeface="Microsoft Uighur"/>
+        <a:font script="Geor" typeface="Sylfaen"/>
+        <a:font script="Armn" typeface="Arial"/>
+        <a:font script="Bugi" typeface="Leelawadee UI"/>
+        <a:font script="Bopo" typeface="Microsoft JhengHei"/>
+        <a:font script="Java" typeface="Javanese Text"/>
+        <a:font script="Lisu" typeface="Segoe UI"/>
+        <a:font script="Mymr" typeface="Myanmar Text"/>
+        <a:font script="Nkoo" typeface="Ebrima"/>
+        <a:font script="Olck" typeface="Nirmala UI"/>
+        <a:font script="Osma" typeface="Ebrima"/>
+        <a:font script="Phag" typeface="Phagspa"/>
+        <a:font script="Syrn" typeface="Estrangelo Edessa"/>
+        <a:font script="Syrj" typeface="Estrangelo Edessa"/>
+        <a:font script="Syre" typeface="Estrangelo Edessa"/>
+        <a:font script="Sora" typeface="Nirmala UI"/>
+        <a:font script="Tale" typeface="Microsoft Tai Le"/>
+        <a:font script="Talu" typeface="Microsoft New Tai Lue"/>
+        <a:font script="Tfng" typeface="Ebrima"/>
+      </a:minorFont>
+    </a:fontScheme>
+    <a:fmtScheme name="Office">
+      <a:fillStyleLst>
+        <a:solidFill>
+          <a:schemeClr val="phClr"/>
+        </a:solidFill>
+        <a:gradFill rotWithShape="1">
+          <a:gsLst>
+            <a:gs pos="0">
+              <a:schemeClr val="phClr">
+                <a:lumMod val="110000"/>
+                <a:satMod val="105000"/>
+                <a:tint val="67000"/>
+              </a:schemeClr>
+            </a:gs>
+            <a:gs pos="50000">
+              <a:schemeClr val="phClr">
+                <a:lumMod val="105000"/>
+                <a:satMod val="103000"/>
+                <a:tint val="73000"/>
+              </a:schemeClr>
+            </a:gs>
+            <a:gs pos="100000">
+              <a:schemeClr val="phClr">
+                <a:lumMod val="105000"/>
+                <a:satMod val="109000"/>
+                <a:tint val="81000"/>
+              </a:schemeClr>
+            </a:gs>
+          </a:gsLst>
+          <a:lin ang="5400000" scaled="0"/>
+        </a:gradFill>
+        <a:gradFill rotWithShape="1">
+          <a:gsLst>
+            <a:gs pos="0">
+              <a:schemeClr val="phClr">
+                <a:satMod val="103000"/>
+                <a:lumMod val="102000"/>
+                <a:tint val="94000"/>
+              </a:schemeClr>
+            </a:gs>
+            <a:gs pos="50000">
+              <a:schemeClr val="phClr">
+                <a:satMod val="110000"/>
+                <a:lumMod val="100000"/>
+                <a:shade val="100000"/>
+              </a:schemeClr>
+            </a:gs>
+            <a:gs pos="100000">
+              <a:schemeClr val="phClr">
+                <a:lumMod val="99000"/>
+                <a:satMod val="120000"/>
+                <a:shade val="78000"/>
+              </a:schemeClr>
+            </a:gs>
+          </a:gsLst>
+          <a:lin ang="5400000" scaled="0"/>
+        </a:gradFill>
+      </a:fillStyleLst>
+      <a:lnStyleLst>
+        <a:ln w="6350" cap="flat" cmpd="sng" algn="ctr">
+          <a:solidFill>
+            <a:schemeClr val="phClr"/>
+          </a:solidFill>
+          <a:prstDash val="solid"/>
+          <a:miter lim="800000"/>
+        </a:ln>
+        <a:ln w="12700" cap="flat" cmpd="sng" algn="ctr">
+          <a:solidFill>
+            <a:schemeClr val="phClr"/>
+          </a:solidFill>
+          <a:prstDash val="solid"/>
+          <a:miter lim="800000"/>
+        </a:ln>
+        <a:ln w="19050" cap="flat" cmpd="sng" algn="ctr">
+          <a:solidFill>
+            <a:schemeClr val="phClr"/>
+          </a:solidFill>
+          <a:prstDash val="solid"/>
+          <a:miter lim="800000"/>
+        </a:ln>
+      </a:lnStyleLst>
+      <a:effectStyleLst>
+        <a:effectStyle>
+          <a:effectLst/>
+        </a:effectStyle>
+        <a:effectStyle>
+          <a:effectLst/>
+        </a:effectStyle>
+        <a:effectStyle>
+          <a:effectLst>
+            <a:outerShdw blurRad="57150" dist="19050" dir="5400000" algn="ctr" rotWithShape="0">
+              <a:srgbClr val="000000">
+                <a:alpha val="63000"/>
+              </a:srgbClr>
+            </a:outerShdw>
+          </a:effectLst>
+        </a:effectStyle>
+      </a:effectStyleLst>
+      <a:bgFillStyleLst>
+        <a:solidFill>
+          <a:schemeClr val="phClr"/>
+        </a:solidFill>
+        <a:solidFill>
+          <a:schemeClr val="phClr">
+            <a:tint val="95000"/>
+            <a:satMod val="170000"/>
+          </a:schemeClr>
+        </a:solidFill>
+        <a:gradFill rotWithShape="1">
+          <a:gsLst>
+            <a:gs pos="0">
+              <a:schemeClr val="phClr">
+                <a:tint val="93000"/>
+                <a:satMod val="150000"/>
+                <a:shade val="98000"/>
+                <a:lumMod val="102000"/>
+              </a:schemeClr>
+            </a:gs>
+            <a:gs pos="50000">
+              <a:schemeClr val="phClr">
+                <a:tint val="98000"/>
+                <a:satMod val="130000"/>
+                <a:shade val="90000"/>
+                <a:lumMod val="103000"/>
+              </a:schemeClr>
+            </a:gs>
+            <a:gs pos="100000">
+              <a:schemeClr val="phClr">
+                <a:shade val="63000"/>
+                <a:satMod val="120000"/>
+              </a:schemeClr>
+            </a:gs>
+          </a:gsLst>
+          <a:lin ang="5400000" scaled="0"/>
+        </a:gradFill>
+      </a:bgFillStyleLst>
+    </a:fmtScheme>
+  </a:themeElements>
+  <a:objectDefaults/>
+  <a:extraClrSchemeLst/>
+  <a:extLst>
+    <a:ext uri="{05A4C25C-085E-4340-85A3-A5531E510DB2}">
+      <thm15:themeFamily xmlns:thm15="http://schemas.microsoft.com/office/thememl/2012/main" name="Office Theme" id="{62F939B6-93AF-4DB8-9C6B-D6C7DFDC589F}" vid="{4A3C46E8-61CC-4603-A589-7422A47A8E4A}"/>
+    </a:ext>
+  </a:extLst>
+</a:theme>
 </file>
</xml_diff>